<commit_message>
Slides partie Lucile OK
</commit_message>
<xml_diff>
--- a/Soutenance finale/soutenance_finale.pptx
+++ b/Soutenance finale/soutenance_finale.pptx
@@ -25,18 +25,20 @@
     <p:sldId id="276" r:id="rId19"/>
     <p:sldId id="277" r:id="rId20"/>
     <p:sldId id="278" r:id="rId21"/>
-    <p:sldId id="279" r:id="rId22"/>
-    <p:sldId id="280" r:id="rId23"/>
-    <p:sldId id="281" r:id="rId24"/>
-    <p:sldId id="282" r:id="rId25"/>
-    <p:sldId id="283" r:id="rId26"/>
-    <p:sldId id="284" r:id="rId27"/>
-    <p:sldId id="268" r:id="rId28"/>
-    <p:sldId id="285" r:id="rId29"/>
-    <p:sldId id="286" r:id="rId30"/>
-    <p:sldId id="261" r:id="rId31"/>
-    <p:sldId id="288" r:id="rId32"/>
-    <p:sldId id="287" r:id="rId33"/>
+    <p:sldId id="289" r:id="rId22"/>
+    <p:sldId id="279" r:id="rId23"/>
+    <p:sldId id="280" r:id="rId24"/>
+    <p:sldId id="281" r:id="rId25"/>
+    <p:sldId id="282" r:id="rId26"/>
+    <p:sldId id="291" r:id="rId27"/>
+    <p:sldId id="283" r:id="rId28"/>
+    <p:sldId id="284" r:id="rId29"/>
+    <p:sldId id="268" r:id="rId30"/>
+    <p:sldId id="285" r:id="rId31"/>
+    <p:sldId id="286" r:id="rId32"/>
+    <p:sldId id="261" r:id="rId33"/>
+    <p:sldId id="288" r:id="rId34"/>
+    <p:sldId id="287" r:id="rId35"/>
   </p:sldIdLst>
   <p:sldSz cx="12192000" cy="6858000"/>
   <p:notesSz cx="6858000" cy="9144000"/>
@@ -274,7 +276,7 @@
           <a:p>
             <a:fld id="{4EEFD721-F78E-4A02-9609-77488C5CEA24}" type="datetimeFigureOut">
               <a:rPr lang="fr-FR" smtClean="0"/>
-              <a:t>23/03/2021</a:t>
+              <a:t>25/03/2021</a:t>
             </a:fld>
             <a:endParaRPr lang="fr-FR"/>
           </a:p>
@@ -444,7 +446,7 @@
           <a:p>
             <a:fld id="{4EEFD721-F78E-4A02-9609-77488C5CEA24}" type="datetimeFigureOut">
               <a:rPr lang="fr-FR" smtClean="0"/>
-              <a:t>23/03/2021</a:t>
+              <a:t>25/03/2021</a:t>
             </a:fld>
             <a:endParaRPr lang="fr-FR"/>
           </a:p>
@@ -624,7 +626,7 @@
           <a:p>
             <a:fld id="{4EEFD721-F78E-4A02-9609-77488C5CEA24}" type="datetimeFigureOut">
               <a:rPr lang="fr-FR" smtClean="0"/>
-              <a:t>23/03/2021</a:t>
+              <a:t>25/03/2021</a:t>
             </a:fld>
             <a:endParaRPr lang="fr-FR"/>
           </a:p>
@@ -794,7 +796,7 @@
           <a:p>
             <a:fld id="{4EEFD721-F78E-4A02-9609-77488C5CEA24}" type="datetimeFigureOut">
               <a:rPr lang="fr-FR" smtClean="0"/>
-              <a:t>23/03/2021</a:t>
+              <a:t>25/03/2021</a:t>
             </a:fld>
             <a:endParaRPr lang="fr-FR"/>
           </a:p>
@@ -1040,7 +1042,7 @@
           <a:p>
             <a:fld id="{4EEFD721-F78E-4A02-9609-77488C5CEA24}" type="datetimeFigureOut">
               <a:rPr lang="fr-FR" smtClean="0"/>
-              <a:t>23/03/2021</a:t>
+              <a:t>25/03/2021</a:t>
             </a:fld>
             <a:endParaRPr lang="fr-FR"/>
           </a:p>
@@ -1272,7 +1274,7 @@
           <a:p>
             <a:fld id="{4EEFD721-F78E-4A02-9609-77488C5CEA24}" type="datetimeFigureOut">
               <a:rPr lang="fr-FR" smtClean="0"/>
-              <a:t>23/03/2021</a:t>
+              <a:t>25/03/2021</a:t>
             </a:fld>
             <a:endParaRPr lang="fr-FR"/>
           </a:p>
@@ -1639,7 +1641,7 @@
           <a:p>
             <a:fld id="{4EEFD721-F78E-4A02-9609-77488C5CEA24}" type="datetimeFigureOut">
               <a:rPr lang="fr-FR" smtClean="0"/>
-              <a:t>23/03/2021</a:t>
+              <a:t>25/03/2021</a:t>
             </a:fld>
             <a:endParaRPr lang="fr-FR"/>
           </a:p>
@@ -1757,7 +1759,7 @@
           <a:p>
             <a:fld id="{4EEFD721-F78E-4A02-9609-77488C5CEA24}" type="datetimeFigureOut">
               <a:rPr lang="fr-FR" smtClean="0"/>
-              <a:t>23/03/2021</a:t>
+              <a:t>25/03/2021</a:t>
             </a:fld>
             <a:endParaRPr lang="fr-FR"/>
           </a:p>
@@ -1852,7 +1854,7 @@
           <a:p>
             <a:fld id="{4EEFD721-F78E-4A02-9609-77488C5CEA24}" type="datetimeFigureOut">
               <a:rPr lang="fr-FR" smtClean="0"/>
-              <a:t>23/03/2021</a:t>
+              <a:t>25/03/2021</a:t>
             </a:fld>
             <a:endParaRPr lang="fr-FR"/>
           </a:p>
@@ -2129,7 +2131,7 @@
           <a:p>
             <a:fld id="{4EEFD721-F78E-4A02-9609-77488C5CEA24}" type="datetimeFigureOut">
               <a:rPr lang="fr-FR" smtClean="0"/>
-              <a:t>23/03/2021</a:t>
+              <a:t>25/03/2021</a:t>
             </a:fld>
             <a:endParaRPr lang="fr-FR"/>
           </a:p>
@@ -2382,7 +2384,7 @@
           <a:p>
             <a:fld id="{4EEFD721-F78E-4A02-9609-77488C5CEA24}" type="datetimeFigureOut">
               <a:rPr lang="fr-FR" smtClean="0"/>
-              <a:t>23/03/2021</a:t>
+              <a:t>25/03/2021</a:t>
             </a:fld>
             <a:endParaRPr lang="fr-FR"/>
           </a:p>
@@ -2598,7 +2600,7 @@
           <a:p>
             <a:fld id="{4EEFD721-F78E-4A02-9609-77488C5CEA24}" type="datetimeFigureOut">
               <a:rPr lang="fr-FR" smtClean="0"/>
-              <a:t>23/03/2021</a:t>
+              <a:t>25/03/2021</a:t>
             </a:fld>
             <a:endParaRPr lang="fr-FR"/>
           </a:p>
@@ -4429,23 +4431,77 @@
           </a:p>
         </p:txBody>
       </p:sp>
-      <p:sp>
-        <p:nvSpPr>
-          <p:cNvPr id="3" name="Rectangle 2"/>
-          <p:cNvSpPr/>
+      <p:pic>
+        <p:nvPicPr>
+          <p:cNvPr id="2" name="Image 1"/>
+          <p:cNvPicPr>
+            <a:picLocks noChangeAspect="1"/>
+          </p:cNvPicPr>
           <p:nvPr/>
-        </p:nvSpPr>
-        <p:spPr>
-          <a:xfrm>
-            <a:off x="3076583" y="3244334"/>
-            <a:ext cx="957185" cy="369332"/>
+        </p:nvPicPr>
+        <p:blipFill>
+          <a:blip r:embed="rId2"/>
+          <a:stretch>
+            <a:fillRect/>
+          </a:stretch>
+        </p:blipFill>
+        <p:spPr>
+          <a:xfrm>
+            <a:off x="3637530" y="1964014"/>
+            <a:ext cx="4805622" cy="1725392"/>
           </a:xfrm>
           <a:prstGeom prst="rect">
             <a:avLst/>
           </a:prstGeom>
         </p:spPr>
-        <p:txBody>
-          <a:bodyPr wrap="none">
+      </p:pic>
+      <p:pic>
+        <p:nvPicPr>
+          <p:cNvPr id="5" name="Image 4"/>
+          <p:cNvPicPr/>
+          <p:nvPr/>
+        </p:nvPicPr>
+        <p:blipFill rotWithShape="1">
+          <a:blip r:embed="rId3"/>
+          <a:srcRect t="10481" b="69972"/>
+          <a:stretch/>
+        </p:blipFill>
+        <p:spPr bwMode="auto">
+          <a:xfrm>
+            <a:off x="564543" y="4292179"/>
+            <a:ext cx="11187485" cy="1270718"/>
+          </a:xfrm>
+          <a:prstGeom prst="rect">
+            <a:avLst/>
+          </a:prstGeom>
+          <a:ln>
+            <a:noFill/>
+          </a:ln>
+          <a:extLst>
+            <a:ext uri="{53640926-AAD7-44D8-BBD7-CCE9431645EC}">
+              <a14:shadowObscured xmlns:a14="http://schemas.microsoft.com/office/drawing/2010/main"/>
+            </a:ext>
+          </a:extLst>
+        </p:spPr>
+      </p:pic>
+      <p:sp>
+        <p:nvSpPr>
+          <p:cNvPr id="6" name="ZoneTexte 5"/>
+          <p:cNvSpPr txBox="1"/>
+          <p:nvPr/>
+        </p:nvSpPr>
+        <p:spPr>
+          <a:xfrm>
+            <a:off x="5029606" y="5647048"/>
+            <a:ext cx="2132788" cy="369332"/>
+          </a:xfrm>
+          <a:prstGeom prst="rect">
+            <a:avLst/>
+          </a:prstGeom>
+          <a:noFill/>
+        </p:spPr>
+        <p:txBody>
+          <a:bodyPr wrap="square" rtlCol="0">
             <a:spAutoFit/>
           </a:bodyPr>
           <a:lstStyle/>
@@ -4456,7 +4512,45 @@
                   <a:schemeClr val="bg1"/>
                 </a:solidFill>
               </a:rPr>
-              <a:t>(LUCILE)</a:t>
+              <a:t>Code d’un panneau</a:t>
+            </a:r>
+            <a:endParaRPr lang="fr-FR" dirty="0">
+              <a:solidFill>
+                <a:schemeClr val="bg1"/>
+              </a:solidFill>
+            </a:endParaRPr>
+          </a:p>
+        </p:txBody>
+      </p:sp>
+      <p:sp>
+        <p:nvSpPr>
+          <p:cNvPr id="7" name="ZoneTexte 6"/>
+          <p:cNvSpPr txBox="1"/>
+          <p:nvPr/>
+        </p:nvSpPr>
+        <p:spPr>
+          <a:xfrm>
+            <a:off x="4110365" y="3696106"/>
+            <a:ext cx="3971270" cy="369332"/>
+          </a:xfrm>
+          <a:prstGeom prst="rect">
+            <a:avLst/>
+          </a:prstGeom>
+          <a:noFill/>
+        </p:spPr>
+        <p:txBody>
+          <a:bodyPr wrap="square" rtlCol="0">
+            <a:spAutoFit/>
+          </a:bodyPr>
+          <a:lstStyle/>
+          <a:p>
+            <a:r>
+              <a:rPr lang="fr-FR" dirty="0" smtClean="0">
+                <a:solidFill>
+                  <a:schemeClr val="bg1"/>
+                </a:solidFill>
+              </a:rPr>
+              <a:t>Exemple de panneau dans le panorama</a:t>
             </a:r>
             <a:endParaRPr lang="fr-FR" dirty="0">
               <a:solidFill>
@@ -6177,43 +6271,94 @@
           </a:p>
         </p:txBody>
       </p:sp>
-      <p:sp>
-        <p:nvSpPr>
-          <p:cNvPr id="3" name="Rectangle 2"/>
-          <p:cNvSpPr/>
+      <p:pic>
+        <p:nvPicPr>
+          <p:cNvPr id="5" name="Image 4"/>
+          <p:cNvPicPr/>
           <p:nvPr/>
-        </p:nvSpPr>
-        <p:spPr>
-          <a:xfrm>
-            <a:off x="3076583" y="3244334"/>
-            <a:ext cx="957185" cy="369332"/>
+        </p:nvPicPr>
+        <p:blipFill>
+          <a:blip r:embed="rId2"/>
+          <a:stretch>
+            <a:fillRect/>
+          </a:stretch>
+        </p:blipFill>
+        <p:spPr>
+          <a:xfrm>
+            <a:off x="2337684" y="3339548"/>
+            <a:ext cx="7839323" cy="566489"/>
           </a:xfrm>
           <a:prstGeom prst="rect">
             <a:avLst/>
           </a:prstGeom>
         </p:spPr>
-        <p:txBody>
-          <a:bodyPr wrap="none">
-            <a:spAutoFit/>
-          </a:bodyPr>
-          <a:lstStyle/>
-          <a:p>
-            <a:r>
-              <a:rPr lang="fr-FR" dirty="0" smtClean="0">
-                <a:solidFill>
-                  <a:schemeClr val="bg1"/>
-                </a:solidFill>
-              </a:rPr>
-              <a:t>(LUCILE)</a:t>
-            </a:r>
-            <a:endParaRPr lang="fr-FR" dirty="0">
-              <a:solidFill>
-                <a:schemeClr val="bg1"/>
-              </a:solidFill>
-            </a:endParaRPr>
-          </a:p>
-        </p:txBody>
-      </p:sp>
+      </p:pic>
+      <p:pic>
+        <p:nvPicPr>
+          <p:cNvPr id="7" name="Image 6"/>
+          <p:cNvPicPr/>
+          <p:nvPr/>
+        </p:nvPicPr>
+        <p:blipFill>
+          <a:blip r:embed="rId3"/>
+          <a:stretch>
+            <a:fillRect/>
+          </a:stretch>
+        </p:blipFill>
+        <p:spPr>
+          <a:xfrm>
+            <a:off x="1987825" y="1737505"/>
+            <a:ext cx="8285259" cy="4337064"/>
+          </a:xfrm>
+          <a:prstGeom prst="rect">
+            <a:avLst/>
+          </a:prstGeom>
+        </p:spPr>
+      </p:pic>
+      <p:pic>
+        <p:nvPicPr>
+          <p:cNvPr id="8" name="Image 7"/>
+          <p:cNvPicPr/>
+          <p:nvPr/>
+        </p:nvPicPr>
+        <p:blipFill>
+          <a:blip r:embed="rId4"/>
+          <a:stretch>
+            <a:fillRect/>
+          </a:stretch>
+        </p:blipFill>
+        <p:spPr>
+          <a:xfrm>
+            <a:off x="1176793" y="1737505"/>
+            <a:ext cx="10185621" cy="4337064"/>
+          </a:xfrm>
+          <a:prstGeom prst="rect">
+            <a:avLst/>
+          </a:prstGeom>
+        </p:spPr>
+      </p:pic>
+      <p:pic>
+        <p:nvPicPr>
+          <p:cNvPr id="9" name="Image 8"/>
+          <p:cNvPicPr/>
+          <p:nvPr/>
+        </p:nvPicPr>
+        <p:blipFill>
+          <a:blip r:embed="rId5"/>
+          <a:stretch>
+            <a:fillRect/>
+          </a:stretch>
+        </p:blipFill>
+        <p:spPr>
+          <a:xfrm>
+            <a:off x="-365760" y="1892410"/>
+            <a:ext cx="12642574" cy="3975652"/>
+          </a:xfrm>
+          <a:prstGeom prst="rect">
+            <a:avLst/>
+          </a:prstGeom>
+        </p:spPr>
+      </p:pic>
     </p:spTree>
     <p:extLst>
       <p:ext uri="{BB962C8B-B14F-4D97-AF65-F5344CB8AC3E}">
@@ -6227,7 +6372,210 @@
   <p:timing>
     <p:tnLst>
       <p:par>
-        <p:cTn id="1" dur="indefinite" restart="never" nodeType="tmRoot"/>
+        <p:cTn id="1" dur="indefinite" restart="never" nodeType="tmRoot">
+          <p:childTnLst>
+            <p:seq concurrent="1" nextAc="seek">
+              <p:cTn id="2" dur="indefinite" nodeType="mainSeq">
+                <p:childTnLst>
+                  <p:par>
+                    <p:cTn id="3" fill="hold">
+                      <p:stCondLst>
+                        <p:cond delay="indefinite"/>
+                      </p:stCondLst>
+                      <p:childTnLst>
+                        <p:par>
+                          <p:cTn id="4" fill="hold">
+                            <p:stCondLst>
+                              <p:cond delay="0"/>
+                            </p:stCondLst>
+                            <p:childTnLst>
+                              <p:par>
+                                <p:cTn id="5" presetID="1" presetClass="entr" presetSubtype="0" fill="hold" nodeType="clickEffect">
+                                  <p:stCondLst>
+                                    <p:cond delay="0"/>
+                                  </p:stCondLst>
+                                  <p:childTnLst>
+                                    <p:set>
+                                      <p:cBhvr>
+                                        <p:cTn id="6" dur="1" fill="hold">
+                                          <p:stCondLst>
+                                            <p:cond delay="0"/>
+                                          </p:stCondLst>
+                                        </p:cTn>
+                                        <p:tgtEl>
+                                          <p:spTgt spid="5"/>
+                                        </p:tgtEl>
+                                        <p:attrNameLst>
+                                          <p:attrName>style.visibility</p:attrName>
+                                        </p:attrNameLst>
+                                      </p:cBhvr>
+                                      <p:to>
+                                        <p:strVal val="visible"/>
+                                      </p:to>
+                                    </p:set>
+                                  </p:childTnLst>
+                                </p:cTn>
+                              </p:par>
+                            </p:childTnLst>
+                          </p:cTn>
+                        </p:par>
+                      </p:childTnLst>
+                    </p:cTn>
+                  </p:par>
+                  <p:par>
+                    <p:cTn id="7" fill="hold">
+                      <p:stCondLst>
+                        <p:cond delay="indefinite"/>
+                      </p:stCondLst>
+                      <p:childTnLst>
+                        <p:par>
+                          <p:cTn id="8" fill="hold">
+                            <p:stCondLst>
+                              <p:cond delay="0"/>
+                            </p:stCondLst>
+                            <p:childTnLst>
+                              <p:par>
+                                <p:cTn id="9" presetID="1" presetClass="entr" presetSubtype="0" fill="hold" nodeType="clickEffect">
+                                  <p:stCondLst>
+                                    <p:cond delay="0"/>
+                                  </p:stCondLst>
+                                  <p:childTnLst>
+                                    <p:set>
+                                      <p:cBhvr>
+                                        <p:cTn id="10" dur="1" fill="hold">
+                                          <p:stCondLst>
+                                            <p:cond delay="0"/>
+                                          </p:stCondLst>
+                                        </p:cTn>
+                                        <p:tgtEl>
+                                          <p:spTgt spid="7"/>
+                                        </p:tgtEl>
+                                        <p:attrNameLst>
+                                          <p:attrName>style.visibility</p:attrName>
+                                        </p:attrNameLst>
+                                      </p:cBhvr>
+                                      <p:to>
+                                        <p:strVal val="visible"/>
+                                      </p:to>
+                                    </p:set>
+                                  </p:childTnLst>
+                                </p:cTn>
+                              </p:par>
+                            </p:childTnLst>
+                          </p:cTn>
+                        </p:par>
+                      </p:childTnLst>
+                    </p:cTn>
+                  </p:par>
+                  <p:par>
+                    <p:cTn id="11" fill="hold">
+                      <p:stCondLst>
+                        <p:cond delay="indefinite"/>
+                      </p:stCondLst>
+                      <p:childTnLst>
+                        <p:par>
+                          <p:cTn id="12" fill="hold">
+                            <p:stCondLst>
+                              <p:cond delay="0"/>
+                            </p:stCondLst>
+                            <p:childTnLst>
+                              <p:par>
+                                <p:cTn id="13" presetID="1" presetClass="entr" presetSubtype="0" fill="hold" nodeType="clickEffect">
+                                  <p:stCondLst>
+                                    <p:cond delay="0"/>
+                                  </p:stCondLst>
+                                  <p:childTnLst>
+                                    <p:set>
+                                      <p:cBhvr>
+                                        <p:cTn id="14" dur="1" fill="hold">
+                                          <p:stCondLst>
+                                            <p:cond delay="0"/>
+                                          </p:stCondLst>
+                                        </p:cTn>
+                                        <p:tgtEl>
+                                          <p:spTgt spid="8"/>
+                                        </p:tgtEl>
+                                        <p:attrNameLst>
+                                          <p:attrName>style.visibility</p:attrName>
+                                        </p:attrNameLst>
+                                      </p:cBhvr>
+                                      <p:to>
+                                        <p:strVal val="visible"/>
+                                      </p:to>
+                                    </p:set>
+                                  </p:childTnLst>
+                                </p:cTn>
+                              </p:par>
+                            </p:childTnLst>
+                          </p:cTn>
+                        </p:par>
+                      </p:childTnLst>
+                    </p:cTn>
+                  </p:par>
+                  <p:par>
+                    <p:cTn id="15" fill="hold">
+                      <p:stCondLst>
+                        <p:cond delay="indefinite"/>
+                      </p:stCondLst>
+                      <p:childTnLst>
+                        <p:par>
+                          <p:cTn id="16" fill="hold">
+                            <p:stCondLst>
+                              <p:cond delay="0"/>
+                            </p:stCondLst>
+                            <p:childTnLst>
+                              <p:par>
+                                <p:cTn id="17" presetID="1" presetClass="entr" presetSubtype="0" fill="hold" nodeType="clickEffect">
+                                  <p:stCondLst>
+                                    <p:cond delay="0"/>
+                                  </p:stCondLst>
+                                  <p:childTnLst>
+                                    <p:set>
+                                      <p:cBhvr>
+                                        <p:cTn id="18" dur="1" fill="hold">
+                                          <p:stCondLst>
+                                            <p:cond delay="0"/>
+                                          </p:stCondLst>
+                                        </p:cTn>
+                                        <p:tgtEl>
+                                          <p:spTgt spid="9"/>
+                                        </p:tgtEl>
+                                        <p:attrNameLst>
+                                          <p:attrName>style.visibility</p:attrName>
+                                        </p:attrNameLst>
+                                      </p:cBhvr>
+                                      <p:to>
+                                        <p:strVal val="visible"/>
+                                      </p:to>
+                                    </p:set>
+                                  </p:childTnLst>
+                                </p:cTn>
+                              </p:par>
+                            </p:childTnLst>
+                          </p:cTn>
+                        </p:par>
+                      </p:childTnLst>
+                    </p:cTn>
+                  </p:par>
+                </p:childTnLst>
+              </p:cTn>
+              <p:prevCondLst>
+                <p:cond evt="onPrev" delay="0">
+                  <p:tgtEl>
+                    <p:sldTgt/>
+                  </p:tgtEl>
+                </p:cond>
+              </p:prevCondLst>
+              <p:nextCondLst>
+                <p:cond evt="onNext" delay="0">
+                  <p:tgtEl>
+                    <p:sldTgt/>
+                  </p:tgtEl>
+                </p:cond>
+              </p:nextCondLst>
+            </p:seq>
+          </p:childTnLst>
+        </p:cTn>
       </p:par>
     </p:tnLst>
   </p:timing>
@@ -6253,57 +6601,122 @@
       </p:grpSpPr>
       <p:sp>
         <p:nvSpPr>
-          <p:cNvPr id="5" name="Espace réservé du contenu 2"/>
-          <p:cNvSpPr>
-            <a:spLocks noGrp="1"/>
+          <p:cNvPr id="4" name="Titre 1">
+            <a:extLst>
+              <a:ext uri="{FF2B5EF4-FFF2-40B4-BE49-F238E27FC236}">
+                <a16:creationId xmlns:a16="http://schemas.microsoft.com/office/drawing/2014/main" id="{66300400-AE21-471A-B195-6FC709360802}"/>
+              </a:ext>
+            </a:extLst>
+          </p:cNvPr>
+          <p:cNvSpPr txBox="1">
+            <a:spLocks/>
           </p:cNvSpPr>
-          <p:nvPr>
-            <p:ph idx="1"/>
-          </p:nvPr>
-        </p:nvSpPr>
-        <p:spPr>
-          <a:xfrm>
-            <a:off x="1192161" y="3123483"/>
-            <a:ext cx="10515600" cy="573446"/>
-          </a:xfrm>
-        </p:spPr>
-        <p:txBody>
-          <a:bodyPr/>
-          <a:lstStyle/>
-          <a:p>
-            <a:pPr marL="0" indent="0">
+          <p:nvPr/>
+        </p:nvSpPr>
+        <p:spPr>
+          <a:xfrm>
+            <a:off x="714756" y="321211"/>
+            <a:ext cx="10762488" cy="1207008"/>
+          </a:xfrm>
+          <a:prstGeom prst="rect">
+            <a:avLst/>
+          </a:prstGeom>
+        </p:spPr>
+        <p:txBody>
+          <a:bodyPr vert="horz" lIns="91440" tIns="45720" rIns="91440" bIns="45720" rtlCol="0" anchor="b">
+            <a:normAutofit/>
+          </a:bodyPr>
+          <a:lstStyle>
+            <a:lvl1pPr algn="l" defTabSz="914400" rtl="0" eaLnBrk="1" latinLnBrk="0" hangingPunct="1">
+              <a:lnSpc>
+                <a:spcPct val="90000"/>
+              </a:lnSpc>
+              <a:spcBef>
+                <a:spcPct val="0"/>
+              </a:spcBef>
               <a:buNone/>
-            </a:pPr>
-            <a:r>
-              <a:rPr lang="fr-FR" dirty="0" smtClean="0">
-                <a:ln>
-                  <a:solidFill>
-                    <a:schemeClr val="bg1"/>
-                  </a:solidFill>
-                </a:ln>
-                <a:solidFill>
-                  <a:schemeClr val="bg1"/>
-                </a:solidFill>
+              <a:defRPr sz="4400" kern="1200">
+                <a:solidFill>
+                  <a:schemeClr val="tx1"/>
+                </a:solidFill>
+                <a:latin typeface="+mj-lt"/>
+                <a:ea typeface="+mj-ea"/>
+                <a:cs typeface="+mj-cs"/>
+              </a:defRPr>
+            </a:lvl1pPr>
+          </a:lstStyle>
+          <a:p>
+            <a:pPr algn="ctr"/>
+            <a:r>
+              <a:rPr lang="en-US" sz="6000" dirty="0" smtClean="0">
+                <a:solidFill>
+                  <a:srgbClr val="FFC000"/>
+                </a:solidFill>
+                <a:latin typeface="+mn-lt"/>
               </a:rPr>
-              <a:t>Diagramme de classe (VICTOR)</a:t>
-            </a:r>
-            <a:endParaRPr lang="fr-FR" dirty="0">
-              <a:ln>
-                <a:solidFill>
-                  <a:schemeClr val="bg1"/>
-                </a:solidFill>
-              </a:ln>
+              <a:t>TUTORIEL</a:t>
+            </a:r>
+            <a:endParaRPr lang="en-US" sz="6000" dirty="0">
               <a:solidFill>
-                <a:schemeClr val="bg1"/>
+                <a:srgbClr val="FFC000"/>
               </a:solidFill>
+              <a:latin typeface="+mn-lt"/>
             </a:endParaRPr>
           </a:p>
         </p:txBody>
       </p:sp>
+      <p:pic>
+        <p:nvPicPr>
+          <p:cNvPr id="5" name="Image 4"/>
+          <p:cNvPicPr>
+            <a:picLocks noChangeAspect="1"/>
+          </p:cNvPicPr>
+          <p:nvPr/>
+        </p:nvPicPr>
+        <p:blipFill>
+          <a:blip r:embed="rId2"/>
+          <a:stretch>
+            <a:fillRect/>
+          </a:stretch>
+        </p:blipFill>
+        <p:spPr>
+          <a:xfrm>
+            <a:off x="3218621" y="1528219"/>
+            <a:ext cx="5754757" cy="4889105"/>
+          </a:xfrm>
+          <a:prstGeom prst="rect">
+            <a:avLst/>
+          </a:prstGeom>
+        </p:spPr>
+      </p:pic>
+      <p:pic>
+        <p:nvPicPr>
+          <p:cNvPr id="6" name="Image 5"/>
+          <p:cNvPicPr>
+            <a:picLocks noChangeAspect="1"/>
+          </p:cNvPicPr>
+          <p:nvPr/>
+        </p:nvPicPr>
+        <p:blipFill>
+          <a:blip r:embed="rId3"/>
+          <a:stretch>
+            <a:fillRect/>
+          </a:stretch>
+        </p:blipFill>
+        <p:spPr>
+          <a:xfrm>
+            <a:off x="2422761" y="1450759"/>
+            <a:ext cx="7346476" cy="5044026"/>
+          </a:xfrm>
+          <a:prstGeom prst="rect">
+            <a:avLst/>
+          </a:prstGeom>
+        </p:spPr>
+      </p:pic>
     </p:spTree>
     <p:extLst>
       <p:ext uri="{BB962C8B-B14F-4D97-AF65-F5344CB8AC3E}">
-        <p14:creationId xmlns:p14="http://schemas.microsoft.com/office/powerpoint/2010/main" val="2124833784"/>
+        <p14:creationId xmlns:p14="http://schemas.microsoft.com/office/powerpoint/2010/main" val="962278725"/>
       </p:ext>
     </p:extLst>
   </p:cSld>
@@ -6313,7 +6726,120 @@
   <p:timing>
     <p:tnLst>
       <p:par>
-        <p:cTn id="1" dur="indefinite" restart="never" nodeType="tmRoot"/>
+        <p:cTn id="1" dur="indefinite" restart="never" nodeType="tmRoot">
+          <p:childTnLst>
+            <p:seq concurrent="1" nextAc="seek">
+              <p:cTn id="2" dur="indefinite" nodeType="mainSeq">
+                <p:childTnLst>
+                  <p:par>
+                    <p:cTn id="3" fill="hold">
+                      <p:stCondLst>
+                        <p:cond delay="indefinite"/>
+                      </p:stCondLst>
+                      <p:childTnLst>
+                        <p:par>
+                          <p:cTn id="4" fill="hold">
+                            <p:stCondLst>
+                              <p:cond delay="0"/>
+                            </p:stCondLst>
+                            <p:childTnLst>
+                              <p:par>
+                                <p:cTn id="5" presetID="1" presetClass="entr" presetSubtype="0" fill="hold" nodeType="clickEffect">
+                                  <p:stCondLst>
+                                    <p:cond delay="0"/>
+                                  </p:stCondLst>
+                                  <p:childTnLst>
+                                    <p:set>
+                                      <p:cBhvr>
+                                        <p:cTn id="6" dur="1" fill="hold">
+                                          <p:stCondLst>
+                                            <p:cond delay="0"/>
+                                          </p:stCondLst>
+                                        </p:cTn>
+                                        <p:tgtEl>
+                                          <p:spTgt spid="5"/>
+                                        </p:tgtEl>
+                                        <p:attrNameLst>
+                                          <p:attrName>style.visibility</p:attrName>
+                                        </p:attrNameLst>
+                                      </p:cBhvr>
+                                      <p:to>
+                                        <p:strVal val="visible"/>
+                                      </p:to>
+                                    </p:set>
+                                  </p:childTnLst>
+                                </p:cTn>
+                              </p:par>
+                            </p:childTnLst>
+                          </p:cTn>
+                        </p:par>
+                      </p:childTnLst>
+                    </p:cTn>
+                  </p:par>
+                  <p:par>
+                    <p:cTn id="7" fill="hold">
+                      <p:stCondLst>
+                        <p:cond delay="indefinite"/>
+                      </p:stCondLst>
+                      <p:childTnLst>
+                        <p:par>
+                          <p:cTn id="8" fill="hold">
+                            <p:stCondLst>
+                              <p:cond delay="0"/>
+                            </p:stCondLst>
+                            <p:childTnLst>
+                              <p:par>
+                                <p:cTn id="9" presetID="1" presetClass="entr" presetSubtype="0" fill="hold" nodeType="clickEffect">
+                                  <p:stCondLst>
+                                    <p:cond delay="0"/>
+                                  </p:stCondLst>
+                                  <p:childTnLst>
+                                    <p:set>
+                                      <p:cBhvr>
+                                        <p:cTn id="10" dur="1" fill="hold">
+                                          <p:stCondLst>
+                                            <p:cond delay="0"/>
+                                          </p:stCondLst>
+                                        </p:cTn>
+                                        <p:tgtEl>
+                                          <p:spTgt spid="6"/>
+                                        </p:tgtEl>
+                                        <p:attrNameLst>
+                                          <p:attrName>style.visibility</p:attrName>
+                                        </p:attrNameLst>
+                                      </p:cBhvr>
+                                      <p:to>
+                                        <p:strVal val="visible"/>
+                                      </p:to>
+                                    </p:set>
+                                  </p:childTnLst>
+                                </p:cTn>
+                              </p:par>
+                            </p:childTnLst>
+                          </p:cTn>
+                        </p:par>
+                      </p:childTnLst>
+                    </p:cTn>
+                  </p:par>
+                </p:childTnLst>
+              </p:cTn>
+              <p:prevCondLst>
+                <p:cond evt="onPrev" delay="0">
+                  <p:tgtEl>
+                    <p:sldTgt/>
+                  </p:tgtEl>
+                </p:cond>
+              </p:prevCondLst>
+              <p:nextCondLst>
+                <p:cond evt="onNext" delay="0">
+                  <p:tgtEl>
+                    <p:sldTgt/>
+                  </p:tgtEl>
+                </p:cond>
+              </p:nextCondLst>
+            </p:seq>
+          </p:childTnLst>
+        </p:cTn>
       </p:par>
     </p:tnLst>
   </p:timing>
@@ -6371,7 +6897,7 @@
                   <a:schemeClr val="bg1"/>
                 </a:solidFill>
               </a:rPr>
-              <a:t>Création d’une scène (VICTOR)</a:t>
+              <a:t>Diagramme de classe (VICTOR)</a:t>
             </a:r>
             <a:endParaRPr lang="fr-FR" dirty="0">
               <a:ln>
@@ -6389,7 +6915,7 @@
     </p:spTree>
     <p:extLst>
       <p:ext uri="{BB962C8B-B14F-4D97-AF65-F5344CB8AC3E}">
-        <p14:creationId xmlns:p14="http://schemas.microsoft.com/office/powerpoint/2010/main" val="1834730809"/>
+        <p14:creationId xmlns:p14="http://schemas.microsoft.com/office/powerpoint/2010/main" val="2124833784"/>
       </p:ext>
     </p:extLst>
   </p:cSld>
@@ -6457,7 +6983,7 @@
                   <a:schemeClr val="bg1"/>
                 </a:solidFill>
               </a:rPr>
-              <a:t>Génération des éléments au clavier (CLARA)</a:t>
+              <a:t>Création d’une scène (VICTOR)</a:t>
             </a:r>
             <a:endParaRPr lang="fr-FR" dirty="0">
               <a:ln>
@@ -6475,7 +7001,7 @@
     </p:spTree>
     <p:extLst>
       <p:ext uri="{BB962C8B-B14F-4D97-AF65-F5344CB8AC3E}">
-        <p14:creationId xmlns:p14="http://schemas.microsoft.com/office/powerpoint/2010/main" val="510744475"/>
+        <p14:creationId xmlns:p14="http://schemas.microsoft.com/office/powerpoint/2010/main" val="1834730809"/>
       </p:ext>
     </p:extLst>
   </p:cSld>
@@ -6511,83 +7037,46 @@
       </p:grpSpPr>
       <p:sp>
         <p:nvSpPr>
-          <p:cNvPr id="4" name="Titre 1">
-            <a:extLst>
-              <a:ext uri="{FF2B5EF4-FFF2-40B4-BE49-F238E27FC236}">
-                <a16:creationId xmlns:a16="http://schemas.microsoft.com/office/drawing/2014/main" id="{66300400-AE21-471A-B195-6FC709360802}"/>
-              </a:ext>
-            </a:extLst>
-          </p:cNvPr>
+          <p:cNvPr id="5" name="Espace réservé du contenu 2"/>
           <p:cNvSpPr>
             <a:spLocks noGrp="1"/>
           </p:cNvSpPr>
           <p:nvPr>
-            <p:ph type="title"/>
+            <p:ph idx="1"/>
           </p:nvPr>
         </p:nvSpPr>
         <p:spPr>
           <a:xfrm>
-            <a:off x="714756" y="321211"/>
-            <a:ext cx="10762488" cy="1207008"/>
-          </a:xfrm>
-        </p:spPr>
-        <p:txBody>
-          <a:bodyPr vert="horz" lIns="91440" tIns="45720" rIns="91440" bIns="45720" rtlCol="0" anchor="b">
-            <a:normAutofit/>
-          </a:bodyPr>
-          <a:lstStyle/>
-          <a:p>
-            <a:pPr algn="ctr"/>
-            <a:r>
-              <a:rPr lang="en-US" sz="6000" dirty="0" smtClean="0">
-                <a:solidFill>
-                  <a:srgbClr val="FFC000"/>
-                </a:solidFill>
-                <a:latin typeface="+mn-lt"/>
+            <a:off x="1192161" y="3123483"/>
+            <a:ext cx="10515600" cy="573446"/>
+          </a:xfrm>
+        </p:spPr>
+        <p:txBody>
+          <a:bodyPr/>
+          <a:lstStyle/>
+          <a:p>
+            <a:pPr marL="0" indent="0">
+              <a:buNone/>
+            </a:pPr>
+            <a:r>
+              <a:rPr lang="fr-FR" dirty="0" smtClean="0">
+                <a:ln>
+                  <a:solidFill>
+                    <a:schemeClr val="bg1"/>
+                  </a:solidFill>
+                </a:ln>
+                <a:solidFill>
+                  <a:schemeClr val="bg1"/>
+                </a:solidFill>
               </a:rPr>
-              <a:t>CREATION DE LA CARTE</a:t>
-            </a:r>
-            <a:endParaRPr lang="en-US" sz="6000" kern="1200" dirty="0">
-              <a:solidFill>
-                <a:srgbClr val="FFC000"/>
-              </a:solidFill>
-              <a:latin typeface="+mn-lt"/>
-              <a:ea typeface="+mj-ea"/>
-              <a:cs typeface="+mj-cs"/>
-            </a:endParaRPr>
-          </a:p>
-        </p:txBody>
-      </p:sp>
-      <p:sp>
-        <p:nvSpPr>
-          <p:cNvPr id="2" name="Rectangle 1"/>
-          <p:cNvSpPr/>
-          <p:nvPr/>
-        </p:nvSpPr>
-        <p:spPr>
-          <a:xfrm>
-            <a:off x="3076583" y="3244334"/>
-            <a:ext cx="957185" cy="369332"/>
-          </a:xfrm>
-          <a:prstGeom prst="rect">
-            <a:avLst/>
-          </a:prstGeom>
-        </p:spPr>
-        <p:txBody>
-          <a:bodyPr wrap="none">
-            <a:spAutoFit/>
-          </a:bodyPr>
-          <a:lstStyle/>
-          <a:p>
-            <a:r>
-              <a:rPr lang="fr-FR" dirty="0" smtClean="0">
+              <a:t>Génération des éléments au clavier (CLARA)</a:t>
+            </a:r>
+            <a:endParaRPr lang="fr-FR" dirty="0">
+              <a:ln>
                 <a:solidFill>
                   <a:schemeClr val="bg1"/>
                 </a:solidFill>
-              </a:rPr>
-              <a:t>(LUCILE)</a:t>
-            </a:r>
-            <a:endParaRPr lang="fr-FR" dirty="0">
+              </a:ln>
               <a:solidFill>
                 <a:schemeClr val="bg1"/>
               </a:solidFill>
@@ -6598,7 +7087,7 @@
     </p:spTree>
     <p:extLst>
       <p:ext uri="{BB962C8B-B14F-4D97-AF65-F5344CB8AC3E}">
-        <p14:creationId xmlns:p14="http://schemas.microsoft.com/office/powerpoint/2010/main" val="3822098439"/>
+        <p14:creationId xmlns:p14="http://schemas.microsoft.com/office/powerpoint/2010/main" val="510744475"/>
       </p:ext>
     </p:extLst>
   </p:cSld>
@@ -6634,57 +7123,129 @@
       </p:grpSpPr>
       <p:sp>
         <p:nvSpPr>
-          <p:cNvPr id="5" name="Espace réservé du contenu 2"/>
+          <p:cNvPr id="4" name="Titre 1">
+            <a:extLst>
+              <a:ext uri="{FF2B5EF4-FFF2-40B4-BE49-F238E27FC236}">
+                <a16:creationId xmlns:a16="http://schemas.microsoft.com/office/drawing/2014/main" id="{66300400-AE21-471A-B195-6FC709360802}"/>
+              </a:ext>
+            </a:extLst>
+          </p:cNvPr>
           <p:cNvSpPr>
             <a:spLocks noGrp="1"/>
           </p:cNvSpPr>
           <p:nvPr>
-            <p:ph idx="1"/>
+            <p:ph type="title"/>
           </p:nvPr>
         </p:nvSpPr>
         <p:spPr>
           <a:xfrm>
-            <a:off x="1192161" y="3123483"/>
-            <a:ext cx="10515600" cy="573446"/>
-          </a:xfrm>
-        </p:spPr>
-        <p:txBody>
-          <a:bodyPr/>
-          <a:lstStyle/>
-          <a:p>
-            <a:pPr marL="0" indent="0">
-              <a:buNone/>
-            </a:pPr>
-            <a:r>
-              <a:rPr lang="fr-FR" dirty="0" smtClean="0">
-                <a:ln>
-                  <a:solidFill>
-                    <a:schemeClr val="bg1"/>
-                  </a:solidFill>
-                </a:ln>
-                <a:solidFill>
-                  <a:schemeClr val="bg1"/>
-                </a:solidFill>
+            <a:off x="714756" y="321211"/>
+            <a:ext cx="10762488" cy="1207008"/>
+          </a:xfrm>
+        </p:spPr>
+        <p:txBody>
+          <a:bodyPr vert="horz" lIns="91440" tIns="45720" rIns="91440" bIns="45720" rtlCol="0" anchor="b">
+            <a:normAutofit/>
+          </a:bodyPr>
+          <a:lstStyle/>
+          <a:p>
+            <a:pPr algn="ctr"/>
+            <a:r>
+              <a:rPr lang="en-US" sz="6000" dirty="0" smtClean="0">
+                <a:solidFill>
+                  <a:srgbClr val="FFC000"/>
+                </a:solidFill>
+                <a:latin typeface="+mn-lt"/>
               </a:rPr>
-              <a:t>Génération du HTML (CLARA)</a:t>
-            </a:r>
-            <a:endParaRPr lang="fr-FR" dirty="0">
-              <a:ln>
-                <a:solidFill>
-                  <a:schemeClr val="bg1"/>
-                </a:solidFill>
-              </a:ln>
+              <a:t>CREATION DE LA CARTE</a:t>
+            </a:r>
+            <a:endParaRPr lang="en-US" sz="6000" kern="1200" dirty="0">
               <a:solidFill>
-                <a:schemeClr val="bg1"/>
+                <a:srgbClr val="FFC000"/>
               </a:solidFill>
+              <a:latin typeface="+mn-lt"/>
+              <a:ea typeface="+mj-ea"/>
+              <a:cs typeface="+mj-cs"/>
             </a:endParaRPr>
           </a:p>
         </p:txBody>
       </p:sp>
+      <p:pic>
+        <p:nvPicPr>
+          <p:cNvPr id="3" name="Image 2"/>
+          <p:cNvPicPr>
+            <a:picLocks noChangeAspect="1"/>
+          </p:cNvPicPr>
+          <p:nvPr/>
+        </p:nvPicPr>
+        <p:blipFill>
+          <a:blip r:embed="rId2"/>
+          <a:stretch>
+            <a:fillRect/>
+          </a:stretch>
+        </p:blipFill>
+        <p:spPr>
+          <a:xfrm>
+            <a:off x="271627" y="3151950"/>
+            <a:ext cx="5119357" cy="1397960"/>
+          </a:xfrm>
+          <a:prstGeom prst="rect">
+            <a:avLst/>
+          </a:prstGeom>
+        </p:spPr>
+      </p:pic>
+      <p:pic>
+        <p:nvPicPr>
+          <p:cNvPr id="5" name="Image 4"/>
+          <p:cNvPicPr>
+            <a:picLocks noChangeAspect="1"/>
+          </p:cNvPicPr>
+          <p:nvPr/>
+        </p:nvPicPr>
+        <p:blipFill>
+          <a:blip r:embed="rId3"/>
+          <a:stretch>
+            <a:fillRect/>
+          </a:stretch>
+        </p:blipFill>
+        <p:spPr>
+          <a:xfrm>
+            <a:off x="5581402" y="2324555"/>
+            <a:ext cx="6425068" cy="3354901"/>
+          </a:xfrm>
+          <a:prstGeom prst="rect">
+            <a:avLst/>
+          </a:prstGeom>
+        </p:spPr>
+      </p:pic>
+      <p:pic>
+        <p:nvPicPr>
+          <p:cNvPr id="7" name="Image 6"/>
+          <p:cNvPicPr>
+            <a:picLocks noChangeAspect="1"/>
+          </p:cNvPicPr>
+          <p:nvPr/>
+        </p:nvPicPr>
+        <p:blipFill>
+          <a:blip r:embed="rId4"/>
+          <a:stretch>
+            <a:fillRect/>
+          </a:stretch>
+        </p:blipFill>
+        <p:spPr>
+          <a:xfrm>
+            <a:off x="5581402" y="1611699"/>
+            <a:ext cx="6425068" cy="4993433"/>
+          </a:xfrm>
+          <a:prstGeom prst="rect">
+            <a:avLst/>
+          </a:prstGeom>
+        </p:spPr>
+      </p:pic>
     </p:spTree>
     <p:extLst>
       <p:ext uri="{BB962C8B-B14F-4D97-AF65-F5344CB8AC3E}">
-        <p14:creationId xmlns:p14="http://schemas.microsoft.com/office/powerpoint/2010/main" val="1415139341"/>
+        <p14:creationId xmlns:p14="http://schemas.microsoft.com/office/powerpoint/2010/main" val="3822098439"/>
       </p:ext>
     </p:extLst>
   </p:cSld>
@@ -6694,7 +7255,120 @@
   <p:timing>
     <p:tnLst>
       <p:par>
-        <p:cTn id="1" dur="indefinite" restart="never" nodeType="tmRoot"/>
+        <p:cTn id="1" dur="indefinite" restart="never" nodeType="tmRoot">
+          <p:childTnLst>
+            <p:seq concurrent="1" nextAc="seek">
+              <p:cTn id="2" dur="indefinite" nodeType="mainSeq">
+                <p:childTnLst>
+                  <p:par>
+                    <p:cTn id="3" fill="hold">
+                      <p:stCondLst>
+                        <p:cond delay="indefinite"/>
+                      </p:stCondLst>
+                      <p:childTnLst>
+                        <p:par>
+                          <p:cTn id="4" fill="hold">
+                            <p:stCondLst>
+                              <p:cond delay="0"/>
+                            </p:stCondLst>
+                            <p:childTnLst>
+                              <p:par>
+                                <p:cTn id="5" presetID="1" presetClass="entr" presetSubtype="0" fill="hold" nodeType="clickEffect">
+                                  <p:stCondLst>
+                                    <p:cond delay="0"/>
+                                  </p:stCondLst>
+                                  <p:childTnLst>
+                                    <p:set>
+                                      <p:cBhvr>
+                                        <p:cTn id="6" dur="1" fill="hold">
+                                          <p:stCondLst>
+                                            <p:cond delay="0"/>
+                                          </p:stCondLst>
+                                        </p:cTn>
+                                        <p:tgtEl>
+                                          <p:spTgt spid="5"/>
+                                        </p:tgtEl>
+                                        <p:attrNameLst>
+                                          <p:attrName>style.visibility</p:attrName>
+                                        </p:attrNameLst>
+                                      </p:cBhvr>
+                                      <p:to>
+                                        <p:strVal val="visible"/>
+                                      </p:to>
+                                    </p:set>
+                                  </p:childTnLst>
+                                </p:cTn>
+                              </p:par>
+                            </p:childTnLst>
+                          </p:cTn>
+                        </p:par>
+                      </p:childTnLst>
+                    </p:cTn>
+                  </p:par>
+                  <p:par>
+                    <p:cTn id="7" fill="hold">
+                      <p:stCondLst>
+                        <p:cond delay="indefinite"/>
+                      </p:stCondLst>
+                      <p:childTnLst>
+                        <p:par>
+                          <p:cTn id="8" fill="hold">
+                            <p:stCondLst>
+                              <p:cond delay="0"/>
+                            </p:stCondLst>
+                            <p:childTnLst>
+                              <p:par>
+                                <p:cTn id="9" presetID="1" presetClass="entr" presetSubtype="0" fill="hold" nodeType="clickEffect">
+                                  <p:stCondLst>
+                                    <p:cond delay="0"/>
+                                  </p:stCondLst>
+                                  <p:childTnLst>
+                                    <p:set>
+                                      <p:cBhvr>
+                                        <p:cTn id="10" dur="1" fill="hold">
+                                          <p:stCondLst>
+                                            <p:cond delay="0"/>
+                                          </p:stCondLst>
+                                        </p:cTn>
+                                        <p:tgtEl>
+                                          <p:spTgt spid="7"/>
+                                        </p:tgtEl>
+                                        <p:attrNameLst>
+                                          <p:attrName>style.visibility</p:attrName>
+                                        </p:attrNameLst>
+                                      </p:cBhvr>
+                                      <p:to>
+                                        <p:strVal val="visible"/>
+                                      </p:to>
+                                    </p:set>
+                                  </p:childTnLst>
+                                </p:cTn>
+                              </p:par>
+                            </p:childTnLst>
+                          </p:cTn>
+                        </p:par>
+                      </p:childTnLst>
+                    </p:cTn>
+                  </p:par>
+                </p:childTnLst>
+              </p:cTn>
+              <p:prevCondLst>
+                <p:cond evt="onPrev" delay="0">
+                  <p:tgtEl>
+                    <p:sldTgt/>
+                  </p:tgtEl>
+                </p:cond>
+              </p:prevCondLst>
+              <p:nextCondLst>
+                <p:cond evt="onNext" delay="0">
+                  <p:tgtEl>
+                    <p:sldTgt/>
+                  </p:tgtEl>
+                </p:cond>
+              </p:nextCondLst>
+            </p:seq>
+          </p:childTnLst>
+        </p:cTn>
       </p:par>
     </p:tnLst>
   </p:timing>
@@ -6718,48 +7392,133 @@
           <a:chExt cx="0" cy="0"/>
         </a:xfrm>
       </p:grpSpPr>
-      <p:sp>
-        <p:nvSpPr>
-          <p:cNvPr id="5" name="Espace réservé du contenu 2"/>
-          <p:cNvSpPr>
-            <a:spLocks noGrp="1"/>
-          </p:cNvSpPr>
-          <p:nvPr>
-            <p:ph idx="1"/>
-          </p:nvPr>
-        </p:nvSpPr>
-        <p:spPr>
-          <a:xfrm>
-            <a:off x="1192161" y="3123483"/>
-            <a:ext cx="10515600" cy="573446"/>
-          </a:xfrm>
-        </p:spPr>
-        <p:txBody>
-          <a:bodyPr/>
-          <a:lstStyle/>
-          <a:p>
-            <a:pPr marL="0" indent="0">
-              <a:buNone/>
-            </a:pPr>
-            <a:r>
-              <a:rPr lang="fr-FR" dirty="0" smtClean="0">
-                <a:ln>
-                  <a:solidFill>
-                    <a:schemeClr val="bg1"/>
-                  </a:solidFill>
-                </a:ln>
+      <p:pic>
+        <p:nvPicPr>
+          <p:cNvPr id="4" name="Image 3"/>
+          <p:cNvPicPr>
+            <a:picLocks noChangeAspect="1"/>
+          </p:cNvPicPr>
+          <p:nvPr/>
+        </p:nvPicPr>
+        <p:blipFill>
+          <a:blip r:embed="rId2"/>
+          <a:stretch>
+            <a:fillRect/>
+          </a:stretch>
+        </p:blipFill>
+        <p:spPr>
+          <a:xfrm>
+            <a:off x="184454" y="1209887"/>
+            <a:ext cx="5262189" cy="3956935"/>
+          </a:xfrm>
+          <a:prstGeom prst="rect">
+            <a:avLst/>
+          </a:prstGeom>
+        </p:spPr>
+      </p:pic>
+      <p:pic>
+        <p:nvPicPr>
+          <p:cNvPr id="5" name="Image 4"/>
+          <p:cNvPicPr>
+            <a:picLocks noChangeAspect="1"/>
+          </p:cNvPicPr>
+          <p:nvPr/>
+        </p:nvPicPr>
+        <p:blipFill>
+          <a:blip r:embed="rId3"/>
+          <a:stretch>
+            <a:fillRect/>
+          </a:stretch>
+        </p:blipFill>
+        <p:spPr>
+          <a:xfrm>
+            <a:off x="7643730" y="716384"/>
+            <a:ext cx="4124325" cy="1304925"/>
+          </a:xfrm>
+          <a:prstGeom prst="rect">
+            <a:avLst/>
+          </a:prstGeom>
+        </p:spPr>
+      </p:pic>
+      <p:pic>
+        <p:nvPicPr>
+          <p:cNvPr id="6" name="Image 5"/>
+          <p:cNvPicPr>
+            <a:picLocks noChangeAspect="1"/>
+          </p:cNvPicPr>
+          <p:nvPr/>
+        </p:nvPicPr>
+        <p:blipFill>
+          <a:blip r:embed="rId4"/>
+          <a:stretch>
+            <a:fillRect/>
+          </a:stretch>
+        </p:blipFill>
+        <p:spPr>
+          <a:xfrm>
+            <a:off x="5628662" y="2365714"/>
+            <a:ext cx="6245286" cy="683695"/>
+          </a:xfrm>
+          <a:prstGeom prst="rect">
+            <a:avLst/>
+          </a:prstGeom>
+        </p:spPr>
+      </p:pic>
+      <p:pic>
+        <p:nvPicPr>
+          <p:cNvPr id="7" name="Image 6"/>
+          <p:cNvPicPr>
+            <a:picLocks noChangeAspect="1"/>
+          </p:cNvPicPr>
+          <p:nvPr/>
+        </p:nvPicPr>
+        <p:blipFill>
+          <a:blip r:embed="rId5"/>
+          <a:stretch>
+            <a:fillRect/>
+          </a:stretch>
+        </p:blipFill>
+        <p:spPr>
+          <a:xfrm>
+            <a:off x="6808950" y="3510900"/>
+            <a:ext cx="4959105" cy="2940864"/>
+          </a:xfrm>
+          <a:prstGeom prst="rect">
+            <a:avLst/>
+          </a:prstGeom>
+        </p:spPr>
+      </p:pic>
+      <p:sp>
+        <p:nvSpPr>
+          <p:cNvPr id="8" name="ZoneTexte 7"/>
+          <p:cNvSpPr txBox="1"/>
+          <p:nvPr/>
+        </p:nvSpPr>
+        <p:spPr>
+          <a:xfrm>
+            <a:off x="8460189" y="2021309"/>
+            <a:ext cx="2226364" cy="369332"/>
+          </a:xfrm>
+          <a:prstGeom prst="rect">
+            <a:avLst/>
+          </a:prstGeom>
+          <a:noFill/>
+        </p:spPr>
+        <p:txBody>
+          <a:bodyPr wrap="square" rtlCol="0">
+            <a:spAutoFit/>
+          </a:bodyPr>
+          <a:lstStyle/>
+          <a:p>
+            <a:r>
+              <a:rPr lang="fr-FR" dirty="0" err="1" smtClean="0">
                 <a:solidFill>
                   <a:schemeClr val="bg1"/>
                 </a:solidFill>
               </a:rPr>
-              <a:t>Téléchargement du zip (VICTOR)</a:t>
+              <a:t>ControleVisiteur.php</a:t>
             </a:r>
             <a:endParaRPr lang="fr-FR" dirty="0">
-              <a:ln>
-                <a:solidFill>
-                  <a:schemeClr val="bg1"/>
-                </a:solidFill>
-              </a:ln>
               <a:solidFill>
                 <a:schemeClr val="bg1"/>
               </a:solidFill>
@@ -6767,10 +7526,86 @@
           </a:p>
         </p:txBody>
       </p:sp>
+      <p:sp>
+        <p:nvSpPr>
+          <p:cNvPr id="9" name="ZoneTexte 8"/>
+          <p:cNvSpPr txBox="1"/>
+          <p:nvPr/>
+        </p:nvSpPr>
+        <p:spPr>
+          <a:xfrm>
+            <a:off x="8100622" y="3141568"/>
+            <a:ext cx="1474073" cy="369332"/>
+          </a:xfrm>
+          <a:prstGeom prst="rect">
+            <a:avLst/>
+          </a:prstGeom>
+          <a:noFill/>
+        </p:spPr>
+        <p:txBody>
+          <a:bodyPr wrap="square" rtlCol="0">
+            <a:spAutoFit/>
+          </a:bodyPr>
+          <a:lstStyle/>
+          <a:p>
+            <a:r>
+              <a:rPr lang="fr-FR" dirty="0" err="1" smtClean="0">
+                <a:solidFill>
+                  <a:schemeClr val="bg1"/>
+                </a:solidFill>
+              </a:rPr>
+              <a:t>Carte.php</a:t>
+            </a:r>
+            <a:endParaRPr lang="fr-FR" dirty="0">
+              <a:solidFill>
+                <a:schemeClr val="bg1"/>
+              </a:solidFill>
+            </a:endParaRPr>
+          </a:p>
+        </p:txBody>
+      </p:sp>
+      <p:sp>
+        <p:nvSpPr>
+          <p:cNvPr id="10" name="ZoneTexte 9"/>
+          <p:cNvSpPr txBox="1"/>
+          <p:nvPr/>
+        </p:nvSpPr>
+        <p:spPr>
+          <a:xfrm>
+            <a:off x="8751305" y="6477562"/>
+            <a:ext cx="1474073" cy="369332"/>
+          </a:xfrm>
+          <a:prstGeom prst="rect">
+            <a:avLst/>
+          </a:prstGeom>
+          <a:noFill/>
+        </p:spPr>
+        <p:txBody>
+          <a:bodyPr wrap="square" rtlCol="0">
+            <a:spAutoFit/>
+          </a:bodyPr>
+          <a:lstStyle/>
+          <a:p>
+            <a:r>
+              <a:rPr lang="fr-FR" dirty="0" smtClean="0">
+                <a:solidFill>
+                  <a:schemeClr val="bg1"/>
+                </a:solidFill>
+              </a:rPr>
+              <a:t>Script JS</a:t>
+            </a:r>
+            <a:endParaRPr lang="fr-FR" dirty="0">
+              <a:solidFill>
+                <a:schemeClr val="bg1"/>
+              </a:solidFill>
+            </a:endParaRPr>
+          </a:p>
+        </p:txBody>
+      </p:sp>
     </p:spTree>
     <p:extLst>
       <p:ext uri="{BB962C8B-B14F-4D97-AF65-F5344CB8AC3E}">
-        <p14:creationId xmlns:p14="http://schemas.microsoft.com/office/powerpoint/2010/main" val="3563562772"/>
+        <p14:creationId xmlns:p14="http://schemas.microsoft.com/office/powerpoint/2010/main" val="4007558412"/>
       </p:ext>
     </p:extLst>
   </p:cSld>
@@ -6806,393 +7641,57 @@
       </p:grpSpPr>
       <p:sp>
         <p:nvSpPr>
-          <p:cNvPr id="4" name="Titre 1">
-            <a:extLst>
-              <a:ext uri="{FF2B5EF4-FFF2-40B4-BE49-F238E27FC236}">
-                <a16:creationId xmlns:a16="http://schemas.microsoft.com/office/drawing/2014/main" id="{66300400-AE21-471A-B195-6FC709360802}"/>
-              </a:ext>
-            </a:extLst>
-          </p:cNvPr>
-          <p:cNvSpPr txBox="1">
-            <a:spLocks/>
+          <p:cNvPr id="5" name="Espace réservé du contenu 2"/>
+          <p:cNvSpPr>
+            <a:spLocks noGrp="1"/>
           </p:cNvSpPr>
-          <p:nvPr/>
-        </p:nvSpPr>
-        <p:spPr>
-          <a:xfrm>
-            <a:off x="3821750" y="2088849"/>
-            <a:ext cx="5558225" cy="2406632"/>
-          </a:xfrm>
-          <a:prstGeom prst="rect">
-            <a:avLst/>
-          </a:prstGeom>
-        </p:spPr>
-        <p:txBody>
-          <a:bodyPr vert="horz" lIns="91440" tIns="45720" rIns="91440" bIns="45720" rtlCol="0" anchor="b">
-            <a:normAutofit/>
-          </a:bodyPr>
-          <a:lstStyle>
-            <a:lvl1pPr algn="l" defTabSz="914400" rtl="0" eaLnBrk="1" latinLnBrk="0" hangingPunct="1">
-              <a:lnSpc>
-                <a:spcPct val="90000"/>
-              </a:lnSpc>
-              <a:spcBef>
-                <a:spcPct val="0"/>
-              </a:spcBef>
+          <p:nvPr>
+            <p:ph idx="1"/>
+          </p:nvPr>
+        </p:nvSpPr>
+        <p:spPr>
+          <a:xfrm>
+            <a:off x="1192161" y="3123483"/>
+            <a:ext cx="10515600" cy="573446"/>
+          </a:xfrm>
+        </p:spPr>
+        <p:txBody>
+          <a:bodyPr/>
+          <a:lstStyle/>
+          <a:p>
+            <a:pPr marL="0" indent="0">
               <a:buNone/>
-              <a:defRPr sz="4400" kern="1200">
-                <a:solidFill>
-                  <a:schemeClr val="tx1"/>
-                </a:solidFill>
-                <a:latin typeface="+mj-lt"/>
-                <a:ea typeface="+mj-ea"/>
-                <a:cs typeface="+mj-cs"/>
-              </a:defRPr>
-            </a:lvl1pPr>
-          </a:lstStyle>
-          <a:p>
-            <a:pPr algn="ctr"/>
-            <a:r>
-              <a:rPr lang="en-US" sz="6000" dirty="0" smtClean="0">
-                <a:solidFill>
-                  <a:srgbClr val="FFC000"/>
-                </a:solidFill>
-                <a:latin typeface="+mn-lt"/>
+            </a:pPr>
+            <a:r>
+              <a:rPr lang="fr-FR" dirty="0" smtClean="0">
+                <a:ln>
+                  <a:solidFill>
+                    <a:schemeClr val="bg1"/>
+                  </a:solidFill>
+                </a:ln>
+                <a:solidFill>
+                  <a:schemeClr val="bg1"/>
+                </a:solidFill>
               </a:rPr>
-              <a:t>BILAN ET PERSPECTIVES</a:t>
-            </a:r>
-            <a:endParaRPr lang="en-US" sz="6000" dirty="0">
+              <a:t>Génération du HTML (CLARA)</a:t>
+            </a:r>
+            <a:endParaRPr lang="fr-FR" dirty="0">
+              <a:ln>
+                <a:solidFill>
+                  <a:schemeClr val="bg1"/>
+                </a:solidFill>
+              </a:ln>
               <a:solidFill>
-                <a:srgbClr val="FFC000"/>
+                <a:schemeClr val="bg1"/>
               </a:solidFill>
-              <a:latin typeface="+mn-lt"/>
             </a:endParaRPr>
-          </a:p>
-        </p:txBody>
-      </p:sp>
-      <p:sp>
-        <p:nvSpPr>
-          <p:cNvPr id="10" name="Pentagone 9"/>
-          <p:cNvSpPr/>
-          <p:nvPr/>
-        </p:nvSpPr>
-        <p:spPr>
-          <a:xfrm>
-            <a:off x="-610258" y="1853432"/>
-            <a:ext cx="1368000" cy="612000"/>
-          </a:xfrm>
-          <a:prstGeom prst="homePlate">
-            <a:avLst/>
-          </a:prstGeom>
-          <a:solidFill>
-            <a:srgbClr val="FBD858"/>
-          </a:solidFill>
-          <a:ln>
-            <a:solidFill>
-              <a:srgbClr val="F7E285"/>
-            </a:solidFill>
-          </a:ln>
-        </p:spPr>
-        <p:style>
-          <a:lnRef idx="2">
-            <a:schemeClr val="accent4">
-              <a:shade val="50000"/>
-            </a:schemeClr>
-          </a:lnRef>
-          <a:fillRef idx="1">
-            <a:schemeClr val="accent4"/>
-          </a:fillRef>
-          <a:effectRef idx="0">
-            <a:schemeClr val="accent4"/>
-          </a:effectRef>
-          <a:fontRef idx="minor">
-            <a:schemeClr val="lt1"/>
-          </a:fontRef>
-        </p:style>
-        <p:txBody>
-          <a:bodyPr rtlCol="0" anchor="ctr"/>
-          <a:lstStyle/>
-          <a:p>
-            <a:pPr algn="ctr"/>
-            <a:endParaRPr lang="fr-FR"/>
-          </a:p>
-        </p:txBody>
-      </p:sp>
-      <p:sp>
-        <p:nvSpPr>
-          <p:cNvPr id="11" name="Pentagone 10"/>
-          <p:cNvSpPr/>
-          <p:nvPr/>
-        </p:nvSpPr>
-        <p:spPr>
-          <a:xfrm>
-            <a:off x="-610258" y="2734115"/>
-            <a:ext cx="1368000" cy="612000"/>
-          </a:xfrm>
-          <a:prstGeom prst="homePlate">
-            <a:avLst/>
-          </a:prstGeom>
-          <a:solidFill>
-            <a:srgbClr val="F7E285"/>
-          </a:solidFill>
-          <a:ln>
-            <a:solidFill>
-              <a:srgbClr val="F7E285"/>
-            </a:solidFill>
-          </a:ln>
-        </p:spPr>
-        <p:style>
-          <a:lnRef idx="2">
-            <a:schemeClr val="accent1">
-              <a:shade val="50000"/>
-            </a:schemeClr>
-          </a:lnRef>
-          <a:fillRef idx="1">
-            <a:schemeClr val="accent1"/>
-          </a:fillRef>
-          <a:effectRef idx="0">
-            <a:schemeClr val="accent1"/>
-          </a:effectRef>
-          <a:fontRef idx="minor">
-            <a:schemeClr val="lt1"/>
-          </a:fontRef>
-        </p:style>
-        <p:txBody>
-          <a:bodyPr rtlCol="0" anchor="ctr"/>
-          <a:lstStyle/>
-          <a:p>
-            <a:pPr algn="ctr"/>
-            <a:endParaRPr lang="fr-FR"/>
-          </a:p>
-        </p:txBody>
-      </p:sp>
-      <p:sp>
-        <p:nvSpPr>
-          <p:cNvPr id="12" name="Pentagone 11"/>
-          <p:cNvSpPr/>
-          <p:nvPr/>
-        </p:nvSpPr>
-        <p:spPr>
-          <a:xfrm>
-            <a:off x="-610258" y="3614800"/>
-            <a:ext cx="1368000" cy="612000"/>
-          </a:xfrm>
-          <a:prstGeom prst="homePlate">
-            <a:avLst/>
-          </a:prstGeom>
-          <a:solidFill>
-            <a:schemeClr val="bg1">
-              <a:lumMod val="85000"/>
-            </a:schemeClr>
-          </a:solidFill>
-          <a:ln>
-            <a:solidFill>
-              <a:schemeClr val="bg1">
-                <a:lumMod val="75000"/>
-              </a:schemeClr>
-            </a:solidFill>
-          </a:ln>
-        </p:spPr>
-        <p:style>
-          <a:lnRef idx="2">
-            <a:schemeClr val="accent1">
-              <a:shade val="50000"/>
-            </a:schemeClr>
-          </a:lnRef>
-          <a:fillRef idx="1">
-            <a:schemeClr val="accent1"/>
-          </a:fillRef>
-          <a:effectRef idx="0">
-            <a:schemeClr val="accent1"/>
-          </a:effectRef>
-          <a:fontRef idx="minor">
-            <a:schemeClr val="lt1"/>
-          </a:fontRef>
-        </p:style>
-        <p:txBody>
-          <a:bodyPr rtlCol="0" anchor="ctr"/>
-          <a:lstStyle/>
-          <a:p>
-            <a:pPr algn="ctr"/>
-            <a:endParaRPr lang="fr-FR"/>
-          </a:p>
-        </p:txBody>
-      </p:sp>
-      <p:sp>
-        <p:nvSpPr>
-          <p:cNvPr id="13" name="Pentagone 12"/>
-          <p:cNvSpPr/>
-          <p:nvPr/>
-        </p:nvSpPr>
-        <p:spPr>
-          <a:xfrm>
-            <a:off x="-610258" y="4495481"/>
-            <a:ext cx="1368000" cy="612000"/>
-          </a:xfrm>
-          <a:prstGeom prst="homePlate">
-            <a:avLst/>
-          </a:prstGeom>
-          <a:solidFill>
-            <a:schemeClr val="bg1">
-              <a:lumMod val="65000"/>
-            </a:schemeClr>
-          </a:solidFill>
-          <a:ln>
-            <a:solidFill>
-              <a:schemeClr val="bg1">
-                <a:lumMod val="65000"/>
-              </a:schemeClr>
-            </a:solidFill>
-          </a:ln>
-        </p:spPr>
-        <p:style>
-          <a:lnRef idx="2">
-            <a:schemeClr val="accent1">
-              <a:shade val="50000"/>
-            </a:schemeClr>
-          </a:lnRef>
-          <a:fillRef idx="1">
-            <a:schemeClr val="accent1"/>
-          </a:fillRef>
-          <a:effectRef idx="0">
-            <a:schemeClr val="accent1"/>
-          </a:effectRef>
-          <a:fontRef idx="minor">
-            <a:schemeClr val="lt1"/>
-          </a:fontRef>
-        </p:style>
-        <p:txBody>
-          <a:bodyPr rtlCol="0" anchor="ctr"/>
-          <a:lstStyle/>
-          <a:p>
-            <a:pPr algn="ctr"/>
-            <a:endParaRPr lang="fr-FR"/>
-          </a:p>
-        </p:txBody>
-      </p:sp>
-      <p:sp>
-        <p:nvSpPr>
-          <p:cNvPr id="14" name="Pentagone 13"/>
-          <p:cNvSpPr/>
-          <p:nvPr/>
-        </p:nvSpPr>
-        <p:spPr>
-          <a:xfrm>
-            <a:off x="0" y="5376166"/>
-            <a:ext cx="1368000" cy="612000"/>
-          </a:xfrm>
-          <a:prstGeom prst="homePlate">
-            <a:avLst/>
-          </a:prstGeom>
-          <a:solidFill>
-            <a:srgbClr val="6D6D6D"/>
-          </a:solidFill>
-          <a:ln>
-            <a:solidFill>
-              <a:srgbClr val="6D6D6D"/>
-            </a:solidFill>
-          </a:ln>
-        </p:spPr>
-        <p:style>
-          <a:lnRef idx="2">
-            <a:schemeClr val="dk1">
-              <a:shade val="50000"/>
-            </a:schemeClr>
-          </a:lnRef>
-          <a:fillRef idx="1">
-            <a:schemeClr val="dk1"/>
-          </a:fillRef>
-          <a:effectRef idx="0">
-            <a:schemeClr val="dk1"/>
-          </a:effectRef>
-          <a:fontRef idx="minor">
-            <a:schemeClr val="lt1"/>
-          </a:fontRef>
-        </p:style>
-        <p:txBody>
-          <a:bodyPr rtlCol="0" anchor="ctr"/>
-          <a:lstStyle/>
-          <a:p>
-            <a:pPr algn="ctr"/>
-            <a:endParaRPr lang="fr-FR"/>
-          </a:p>
-        </p:txBody>
-      </p:sp>
-      <p:sp>
-        <p:nvSpPr>
-          <p:cNvPr id="20" name="Pentagone 19"/>
-          <p:cNvSpPr/>
-          <p:nvPr/>
-        </p:nvSpPr>
-        <p:spPr>
-          <a:xfrm>
-            <a:off x="-610258" y="972749"/>
-            <a:ext cx="1368000" cy="612000"/>
-          </a:xfrm>
-          <a:prstGeom prst="homePlate">
-            <a:avLst/>
-          </a:prstGeom>
-        </p:spPr>
-        <p:style>
-          <a:lnRef idx="2">
-            <a:schemeClr val="accent4">
-              <a:shade val="50000"/>
-            </a:schemeClr>
-          </a:lnRef>
-          <a:fillRef idx="1">
-            <a:schemeClr val="accent4"/>
-          </a:fillRef>
-          <a:effectRef idx="0">
-            <a:schemeClr val="accent4"/>
-          </a:effectRef>
-          <a:fontRef idx="minor">
-            <a:schemeClr val="lt1"/>
-          </a:fontRef>
-        </p:style>
-        <p:txBody>
-          <a:bodyPr rtlCol="0" anchor="ctr"/>
-          <a:lstStyle/>
-          <a:p>
-            <a:pPr algn="ctr"/>
-            <a:endParaRPr lang="fr-FR"/>
-          </a:p>
-        </p:txBody>
-      </p:sp>
-      <p:sp>
-        <p:nvSpPr>
-          <p:cNvPr id="15" name="ZoneTexte 14"/>
-          <p:cNvSpPr txBox="1"/>
-          <p:nvPr/>
-        </p:nvSpPr>
-        <p:spPr>
-          <a:xfrm>
-            <a:off x="482439" y="5297445"/>
-            <a:ext cx="403122" cy="769441"/>
-          </a:xfrm>
-          <a:prstGeom prst="rect">
-            <a:avLst/>
-          </a:prstGeom>
-          <a:noFill/>
-        </p:spPr>
-        <p:txBody>
-          <a:bodyPr wrap="square" rtlCol="0">
-            <a:spAutoFit/>
-          </a:bodyPr>
-          <a:lstStyle/>
-          <a:p>
-            <a:r>
-              <a:rPr lang="fr-FR" sz="4400" dirty="0">
-                <a:latin typeface="Bahnschrift Condensed" panose="020B0502040204020203" pitchFamily="34" charset="0"/>
-              </a:rPr>
-              <a:t>5</a:t>
-            </a:r>
           </a:p>
         </p:txBody>
       </p:sp>
     </p:spTree>
     <p:extLst>
       <p:ext uri="{BB962C8B-B14F-4D97-AF65-F5344CB8AC3E}">
-        <p14:creationId xmlns:p14="http://schemas.microsoft.com/office/powerpoint/2010/main" val="4029058044"/>
+        <p14:creationId xmlns:p14="http://schemas.microsoft.com/office/powerpoint/2010/main" val="1415139341"/>
       </p:ext>
     </p:extLst>
   </p:cSld>
@@ -7260,7 +7759,7 @@
                   <a:schemeClr val="bg1"/>
                 </a:solidFill>
               </a:rPr>
-              <a:t>Bilan technique et perspectives (CLEMENT)</a:t>
+              <a:t>Téléchargement du zip (VICTOR)</a:t>
             </a:r>
             <a:endParaRPr lang="fr-FR" dirty="0">
               <a:ln>
@@ -7278,7 +7777,7 @@
     </p:spTree>
     <p:extLst>
       <p:ext uri="{BB962C8B-B14F-4D97-AF65-F5344CB8AC3E}">
-        <p14:creationId xmlns:p14="http://schemas.microsoft.com/office/powerpoint/2010/main" val="1274004051"/>
+        <p14:creationId xmlns:p14="http://schemas.microsoft.com/office/powerpoint/2010/main" val="3563562772"/>
       </p:ext>
     </p:extLst>
   </p:cSld>
@@ -7314,57 +7813,393 @@
       </p:grpSpPr>
       <p:sp>
         <p:nvSpPr>
-          <p:cNvPr id="5" name="Espace réservé du contenu 2"/>
-          <p:cNvSpPr>
-            <a:spLocks noGrp="1"/>
+          <p:cNvPr id="4" name="Titre 1">
+            <a:extLst>
+              <a:ext uri="{FF2B5EF4-FFF2-40B4-BE49-F238E27FC236}">
+                <a16:creationId xmlns:a16="http://schemas.microsoft.com/office/drawing/2014/main" id="{66300400-AE21-471A-B195-6FC709360802}"/>
+              </a:ext>
+            </a:extLst>
+          </p:cNvPr>
+          <p:cNvSpPr txBox="1">
+            <a:spLocks/>
           </p:cNvSpPr>
-          <p:nvPr>
-            <p:ph idx="1"/>
-          </p:nvPr>
-        </p:nvSpPr>
-        <p:spPr>
-          <a:xfrm>
-            <a:off x="1192161" y="3123483"/>
-            <a:ext cx="10515600" cy="573446"/>
-          </a:xfrm>
-        </p:spPr>
-        <p:txBody>
-          <a:bodyPr/>
-          <a:lstStyle/>
-          <a:p>
-            <a:pPr marL="0" indent="0">
+          <p:nvPr/>
+        </p:nvSpPr>
+        <p:spPr>
+          <a:xfrm>
+            <a:off x="3821750" y="2088849"/>
+            <a:ext cx="5558225" cy="2406632"/>
+          </a:xfrm>
+          <a:prstGeom prst="rect">
+            <a:avLst/>
+          </a:prstGeom>
+        </p:spPr>
+        <p:txBody>
+          <a:bodyPr vert="horz" lIns="91440" tIns="45720" rIns="91440" bIns="45720" rtlCol="0" anchor="b">
+            <a:normAutofit/>
+          </a:bodyPr>
+          <a:lstStyle>
+            <a:lvl1pPr algn="l" defTabSz="914400" rtl="0" eaLnBrk="1" latinLnBrk="0" hangingPunct="1">
+              <a:lnSpc>
+                <a:spcPct val="90000"/>
+              </a:lnSpc>
+              <a:spcBef>
+                <a:spcPct val="0"/>
+              </a:spcBef>
               <a:buNone/>
-            </a:pPr>
-            <a:r>
-              <a:rPr lang="fr-FR" dirty="0" smtClean="0">
-                <a:ln>
-                  <a:solidFill>
-                    <a:schemeClr val="bg1"/>
-                  </a:solidFill>
-                </a:ln>
-                <a:solidFill>
-                  <a:schemeClr val="bg1"/>
-                </a:solidFill>
+              <a:defRPr sz="4400" kern="1200">
+                <a:solidFill>
+                  <a:schemeClr val="tx1"/>
+                </a:solidFill>
+                <a:latin typeface="+mj-lt"/>
+                <a:ea typeface="+mj-ea"/>
+                <a:cs typeface="+mj-cs"/>
+              </a:defRPr>
+            </a:lvl1pPr>
+          </a:lstStyle>
+          <a:p>
+            <a:pPr algn="ctr"/>
+            <a:r>
+              <a:rPr lang="en-US" sz="6000" dirty="0" smtClean="0">
+                <a:solidFill>
+                  <a:srgbClr val="FFC000"/>
+                </a:solidFill>
+                <a:latin typeface="+mn-lt"/>
               </a:rPr>
-              <a:t>Conclusion + merci et au revoir (CLARA)</a:t>
-            </a:r>
-            <a:endParaRPr lang="fr-FR" dirty="0">
-              <a:ln>
-                <a:solidFill>
-                  <a:schemeClr val="bg1"/>
-                </a:solidFill>
-              </a:ln>
+              <a:t>BILAN ET PERSPECTIVES</a:t>
+            </a:r>
+            <a:endParaRPr lang="en-US" sz="6000" dirty="0">
               <a:solidFill>
-                <a:schemeClr val="bg1"/>
+                <a:srgbClr val="FFC000"/>
               </a:solidFill>
+              <a:latin typeface="+mn-lt"/>
             </a:endParaRPr>
+          </a:p>
+        </p:txBody>
+      </p:sp>
+      <p:sp>
+        <p:nvSpPr>
+          <p:cNvPr id="10" name="Pentagone 9"/>
+          <p:cNvSpPr/>
+          <p:nvPr/>
+        </p:nvSpPr>
+        <p:spPr>
+          <a:xfrm>
+            <a:off x="-610258" y="1853432"/>
+            <a:ext cx="1368000" cy="612000"/>
+          </a:xfrm>
+          <a:prstGeom prst="homePlate">
+            <a:avLst/>
+          </a:prstGeom>
+          <a:solidFill>
+            <a:srgbClr val="FBD858"/>
+          </a:solidFill>
+          <a:ln>
+            <a:solidFill>
+              <a:srgbClr val="F7E285"/>
+            </a:solidFill>
+          </a:ln>
+        </p:spPr>
+        <p:style>
+          <a:lnRef idx="2">
+            <a:schemeClr val="accent4">
+              <a:shade val="50000"/>
+            </a:schemeClr>
+          </a:lnRef>
+          <a:fillRef idx="1">
+            <a:schemeClr val="accent4"/>
+          </a:fillRef>
+          <a:effectRef idx="0">
+            <a:schemeClr val="accent4"/>
+          </a:effectRef>
+          <a:fontRef idx="minor">
+            <a:schemeClr val="lt1"/>
+          </a:fontRef>
+        </p:style>
+        <p:txBody>
+          <a:bodyPr rtlCol="0" anchor="ctr"/>
+          <a:lstStyle/>
+          <a:p>
+            <a:pPr algn="ctr"/>
+            <a:endParaRPr lang="fr-FR"/>
+          </a:p>
+        </p:txBody>
+      </p:sp>
+      <p:sp>
+        <p:nvSpPr>
+          <p:cNvPr id="11" name="Pentagone 10"/>
+          <p:cNvSpPr/>
+          <p:nvPr/>
+        </p:nvSpPr>
+        <p:spPr>
+          <a:xfrm>
+            <a:off x="-610258" y="2734115"/>
+            <a:ext cx="1368000" cy="612000"/>
+          </a:xfrm>
+          <a:prstGeom prst="homePlate">
+            <a:avLst/>
+          </a:prstGeom>
+          <a:solidFill>
+            <a:srgbClr val="F7E285"/>
+          </a:solidFill>
+          <a:ln>
+            <a:solidFill>
+              <a:srgbClr val="F7E285"/>
+            </a:solidFill>
+          </a:ln>
+        </p:spPr>
+        <p:style>
+          <a:lnRef idx="2">
+            <a:schemeClr val="accent1">
+              <a:shade val="50000"/>
+            </a:schemeClr>
+          </a:lnRef>
+          <a:fillRef idx="1">
+            <a:schemeClr val="accent1"/>
+          </a:fillRef>
+          <a:effectRef idx="0">
+            <a:schemeClr val="accent1"/>
+          </a:effectRef>
+          <a:fontRef idx="minor">
+            <a:schemeClr val="lt1"/>
+          </a:fontRef>
+        </p:style>
+        <p:txBody>
+          <a:bodyPr rtlCol="0" anchor="ctr"/>
+          <a:lstStyle/>
+          <a:p>
+            <a:pPr algn="ctr"/>
+            <a:endParaRPr lang="fr-FR"/>
+          </a:p>
+        </p:txBody>
+      </p:sp>
+      <p:sp>
+        <p:nvSpPr>
+          <p:cNvPr id="12" name="Pentagone 11"/>
+          <p:cNvSpPr/>
+          <p:nvPr/>
+        </p:nvSpPr>
+        <p:spPr>
+          <a:xfrm>
+            <a:off x="-610258" y="3614800"/>
+            <a:ext cx="1368000" cy="612000"/>
+          </a:xfrm>
+          <a:prstGeom prst="homePlate">
+            <a:avLst/>
+          </a:prstGeom>
+          <a:solidFill>
+            <a:schemeClr val="bg1">
+              <a:lumMod val="85000"/>
+            </a:schemeClr>
+          </a:solidFill>
+          <a:ln>
+            <a:solidFill>
+              <a:schemeClr val="bg1">
+                <a:lumMod val="75000"/>
+              </a:schemeClr>
+            </a:solidFill>
+          </a:ln>
+        </p:spPr>
+        <p:style>
+          <a:lnRef idx="2">
+            <a:schemeClr val="accent1">
+              <a:shade val="50000"/>
+            </a:schemeClr>
+          </a:lnRef>
+          <a:fillRef idx="1">
+            <a:schemeClr val="accent1"/>
+          </a:fillRef>
+          <a:effectRef idx="0">
+            <a:schemeClr val="accent1"/>
+          </a:effectRef>
+          <a:fontRef idx="minor">
+            <a:schemeClr val="lt1"/>
+          </a:fontRef>
+        </p:style>
+        <p:txBody>
+          <a:bodyPr rtlCol="0" anchor="ctr"/>
+          <a:lstStyle/>
+          <a:p>
+            <a:pPr algn="ctr"/>
+            <a:endParaRPr lang="fr-FR"/>
+          </a:p>
+        </p:txBody>
+      </p:sp>
+      <p:sp>
+        <p:nvSpPr>
+          <p:cNvPr id="13" name="Pentagone 12"/>
+          <p:cNvSpPr/>
+          <p:nvPr/>
+        </p:nvSpPr>
+        <p:spPr>
+          <a:xfrm>
+            <a:off x="-610258" y="4495481"/>
+            <a:ext cx="1368000" cy="612000"/>
+          </a:xfrm>
+          <a:prstGeom prst="homePlate">
+            <a:avLst/>
+          </a:prstGeom>
+          <a:solidFill>
+            <a:schemeClr val="bg1">
+              <a:lumMod val="65000"/>
+            </a:schemeClr>
+          </a:solidFill>
+          <a:ln>
+            <a:solidFill>
+              <a:schemeClr val="bg1">
+                <a:lumMod val="65000"/>
+              </a:schemeClr>
+            </a:solidFill>
+          </a:ln>
+        </p:spPr>
+        <p:style>
+          <a:lnRef idx="2">
+            <a:schemeClr val="accent1">
+              <a:shade val="50000"/>
+            </a:schemeClr>
+          </a:lnRef>
+          <a:fillRef idx="1">
+            <a:schemeClr val="accent1"/>
+          </a:fillRef>
+          <a:effectRef idx="0">
+            <a:schemeClr val="accent1"/>
+          </a:effectRef>
+          <a:fontRef idx="minor">
+            <a:schemeClr val="lt1"/>
+          </a:fontRef>
+        </p:style>
+        <p:txBody>
+          <a:bodyPr rtlCol="0" anchor="ctr"/>
+          <a:lstStyle/>
+          <a:p>
+            <a:pPr algn="ctr"/>
+            <a:endParaRPr lang="fr-FR"/>
+          </a:p>
+        </p:txBody>
+      </p:sp>
+      <p:sp>
+        <p:nvSpPr>
+          <p:cNvPr id="14" name="Pentagone 13"/>
+          <p:cNvSpPr/>
+          <p:nvPr/>
+        </p:nvSpPr>
+        <p:spPr>
+          <a:xfrm>
+            <a:off x="0" y="5376166"/>
+            <a:ext cx="1368000" cy="612000"/>
+          </a:xfrm>
+          <a:prstGeom prst="homePlate">
+            <a:avLst/>
+          </a:prstGeom>
+          <a:solidFill>
+            <a:srgbClr val="6D6D6D"/>
+          </a:solidFill>
+          <a:ln>
+            <a:solidFill>
+              <a:srgbClr val="6D6D6D"/>
+            </a:solidFill>
+          </a:ln>
+        </p:spPr>
+        <p:style>
+          <a:lnRef idx="2">
+            <a:schemeClr val="dk1">
+              <a:shade val="50000"/>
+            </a:schemeClr>
+          </a:lnRef>
+          <a:fillRef idx="1">
+            <a:schemeClr val="dk1"/>
+          </a:fillRef>
+          <a:effectRef idx="0">
+            <a:schemeClr val="dk1"/>
+          </a:effectRef>
+          <a:fontRef idx="minor">
+            <a:schemeClr val="lt1"/>
+          </a:fontRef>
+        </p:style>
+        <p:txBody>
+          <a:bodyPr rtlCol="0" anchor="ctr"/>
+          <a:lstStyle/>
+          <a:p>
+            <a:pPr algn="ctr"/>
+            <a:endParaRPr lang="fr-FR"/>
+          </a:p>
+        </p:txBody>
+      </p:sp>
+      <p:sp>
+        <p:nvSpPr>
+          <p:cNvPr id="20" name="Pentagone 19"/>
+          <p:cNvSpPr/>
+          <p:nvPr/>
+        </p:nvSpPr>
+        <p:spPr>
+          <a:xfrm>
+            <a:off x="-610258" y="972749"/>
+            <a:ext cx="1368000" cy="612000"/>
+          </a:xfrm>
+          <a:prstGeom prst="homePlate">
+            <a:avLst/>
+          </a:prstGeom>
+        </p:spPr>
+        <p:style>
+          <a:lnRef idx="2">
+            <a:schemeClr val="accent4">
+              <a:shade val="50000"/>
+            </a:schemeClr>
+          </a:lnRef>
+          <a:fillRef idx="1">
+            <a:schemeClr val="accent4"/>
+          </a:fillRef>
+          <a:effectRef idx="0">
+            <a:schemeClr val="accent4"/>
+          </a:effectRef>
+          <a:fontRef idx="minor">
+            <a:schemeClr val="lt1"/>
+          </a:fontRef>
+        </p:style>
+        <p:txBody>
+          <a:bodyPr rtlCol="0" anchor="ctr"/>
+          <a:lstStyle/>
+          <a:p>
+            <a:pPr algn="ctr"/>
+            <a:endParaRPr lang="fr-FR"/>
+          </a:p>
+        </p:txBody>
+      </p:sp>
+      <p:sp>
+        <p:nvSpPr>
+          <p:cNvPr id="15" name="ZoneTexte 14"/>
+          <p:cNvSpPr txBox="1"/>
+          <p:nvPr/>
+        </p:nvSpPr>
+        <p:spPr>
+          <a:xfrm>
+            <a:off x="482439" y="5297445"/>
+            <a:ext cx="403122" cy="769441"/>
+          </a:xfrm>
+          <a:prstGeom prst="rect">
+            <a:avLst/>
+          </a:prstGeom>
+          <a:noFill/>
+        </p:spPr>
+        <p:txBody>
+          <a:bodyPr wrap="square" rtlCol="0">
+            <a:spAutoFit/>
+          </a:bodyPr>
+          <a:lstStyle/>
+          <a:p>
+            <a:r>
+              <a:rPr lang="fr-FR" sz="4400" dirty="0">
+                <a:latin typeface="Bahnschrift Condensed" panose="020B0502040204020203" pitchFamily="34" charset="0"/>
+              </a:rPr>
+              <a:t>5</a:t>
+            </a:r>
           </a:p>
         </p:txBody>
       </p:sp>
     </p:spTree>
     <p:extLst>
       <p:ext uri="{BB962C8B-B14F-4D97-AF65-F5344CB8AC3E}">
-        <p14:creationId xmlns:p14="http://schemas.microsoft.com/office/powerpoint/2010/main" val="2001280757"/>
+        <p14:creationId xmlns:p14="http://schemas.microsoft.com/office/powerpoint/2010/main" val="4029058044"/>
       </p:ext>
     </p:extLst>
   </p:cSld>
@@ -7822,66 +8657,49 @@
       </p:grpSpPr>
       <p:sp>
         <p:nvSpPr>
-          <p:cNvPr id="7" name="Titre 1">
-            <a:extLst>
-              <a:ext uri="{FF2B5EF4-FFF2-40B4-BE49-F238E27FC236}">
-                <a16:creationId xmlns:a16="http://schemas.microsoft.com/office/drawing/2014/main" id="{66300400-AE21-471A-B195-6FC709360802}"/>
-              </a:ext>
-            </a:extLst>
-          </p:cNvPr>
-          <p:cNvSpPr txBox="1">
-            <a:spLocks/>
+          <p:cNvPr id="5" name="Espace réservé du contenu 2"/>
+          <p:cNvSpPr>
+            <a:spLocks noGrp="1"/>
           </p:cNvSpPr>
-          <p:nvPr/>
-        </p:nvSpPr>
-        <p:spPr>
-          <a:xfrm>
-            <a:off x="3251479" y="1508745"/>
-            <a:ext cx="5558225" cy="2406632"/>
-          </a:xfrm>
-          <a:prstGeom prst="rect">
-            <a:avLst/>
-          </a:prstGeom>
-        </p:spPr>
-        <p:txBody>
-          <a:bodyPr vert="horz" lIns="91440" tIns="45720" rIns="91440" bIns="45720" rtlCol="0" anchor="b">
-            <a:normAutofit/>
-          </a:bodyPr>
-          <a:lstStyle>
-            <a:lvl1pPr algn="l" defTabSz="914400" rtl="0" eaLnBrk="1" latinLnBrk="0" hangingPunct="1">
-              <a:lnSpc>
-                <a:spcPct val="90000"/>
-              </a:lnSpc>
-              <a:spcBef>
-                <a:spcPct val="0"/>
-              </a:spcBef>
+          <p:nvPr>
+            <p:ph idx="1"/>
+          </p:nvPr>
+        </p:nvSpPr>
+        <p:spPr>
+          <a:xfrm>
+            <a:off x="1192161" y="3123483"/>
+            <a:ext cx="10515600" cy="573446"/>
+          </a:xfrm>
+        </p:spPr>
+        <p:txBody>
+          <a:bodyPr/>
+          <a:lstStyle/>
+          <a:p>
+            <a:pPr marL="0" indent="0">
               <a:buNone/>
-              <a:defRPr sz="4400" kern="1200">
-                <a:solidFill>
-                  <a:schemeClr val="tx1"/>
-                </a:solidFill>
-                <a:latin typeface="+mj-lt"/>
-                <a:ea typeface="+mj-ea"/>
-                <a:cs typeface="+mj-cs"/>
-              </a:defRPr>
-            </a:lvl1pPr>
-          </a:lstStyle>
-          <a:p>
-            <a:pPr algn="ctr"/>
-            <a:r>
-              <a:rPr lang="en-US" sz="6000" dirty="0" smtClean="0">
-                <a:solidFill>
-                  <a:srgbClr val="FFC000"/>
-                </a:solidFill>
-                <a:latin typeface="+mn-lt"/>
+            </a:pPr>
+            <a:r>
+              <a:rPr lang="fr-FR" dirty="0" smtClean="0">
+                <a:ln>
+                  <a:solidFill>
+                    <a:schemeClr val="bg1"/>
+                  </a:solidFill>
+                </a:ln>
+                <a:solidFill>
+                  <a:schemeClr val="bg1"/>
+                </a:solidFill>
               </a:rPr>
-              <a:t>ANNEXES</a:t>
-            </a:r>
-            <a:endParaRPr lang="en-US" sz="6000" dirty="0">
+              <a:t>Bilan technique et perspectives (CLEMENT)</a:t>
+            </a:r>
+            <a:endParaRPr lang="fr-FR" dirty="0">
+              <a:ln>
+                <a:solidFill>
+                  <a:schemeClr val="bg1"/>
+                </a:solidFill>
+              </a:ln>
               <a:solidFill>
-                <a:srgbClr val="FFC000"/>
+                <a:schemeClr val="bg1"/>
               </a:solidFill>
-              <a:latin typeface="+mn-lt"/>
             </a:endParaRPr>
           </a:p>
         </p:txBody>
@@ -7889,7 +8707,7 @@
     </p:spTree>
     <p:extLst>
       <p:ext uri="{BB962C8B-B14F-4D97-AF65-F5344CB8AC3E}">
-        <p14:creationId xmlns:p14="http://schemas.microsoft.com/office/powerpoint/2010/main" val="2379412154"/>
+        <p14:creationId xmlns:p14="http://schemas.microsoft.com/office/powerpoint/2010/main" val="1274004051"/>
       </p:ext>
     </p:extLst>
   </p:cSld>
@@ -7925,6 +8743,195 @@
       </p:grpSpPr>
       <p:sp>
         <p:nvSpPr>
+          <p:cNvPr id="5" name="Espace réservé du contenu 2"/>
+          <p:cNvSpPr>
+            <a:spLocks noGrp="1"/>
+          </p:cNvSpPr>
+          <p:nvPr>
+            <p:ph idx="1"/>
+          </p:nvPr>
+        </p:nvSpPr>
+        <p:spPr>
+          <a:xfrm>
+            <a:off x="1192161" y="3123483"/>
+            <a:ext cx="10515600" cy="573446"/>
+          </a:xfrm>
+        </p:spPr>
+        <p:txBody>
+          <a:bodyPr/>
+          <a:lstStyle/>
+          <a:p>
+            <a:pPr marL="0" indent="0">
+              <a:buNone/>
+            </a:pPr>
+            <a:r>
+              <a:rPr lang="fr-FR" dirty="0" smtClean="0">
+                <a:ln>
+                  <a:solidFill>
+                    <a:schemeClr val="bg1"/>
+                  </a:solidFill>
+                </a:ln>
+                <a:solidFill>
+                  <a:schemeClr val="bg1"/>
+                </a:solidFill>
+              </a:rPr>
+              <a:t>Conclusion + merci et au revoir (CLARA)</a:t>
+            </a:r>
+            <a:endParaRPr lang="fr-FR" dirty="0">
+              <a:ln>
+                <a:solidFill>
+                  <a:schemeClr val="bg1"/>
+                </a:solidFill>
+              </a:ln>
+              <a:solidFill>
+                <a:schemeClr val="bg1"/>
+              </a:solidFill>
+            </a:endParaRPr>
+          </a:p>
+        </p:txBody>
+      </p:sp>
+    </p:spTree>
+    <p:extLst>
+      <p:ext uri="{BB962C8B-B14F-4D97-AF65-F5344CB8AC3E}">
+        <p14:creationId xmlns:p14="http://schemas.microsoft.com/office/powerpoint/2010/main" val="2001280757"/>
+      </p:ext>
+    </p:extLst>
+  </p:cSld>
+  <p:clrMapOvr>
+    <a:masterClrMapping/>
+  </p:clrMapOvr>
+  <p:timing>
+    <p:tnLst>
+      <p:par>
+        <p:cTn id="1" dur="indefinite" restart="never" nodeType="tmRoot"/>
+      </p:par>
+    </p:tnLst>
+  </p:timing>
+</p:sld>
+</file>
+
+<file path=ppt/slides/slide32.xml><?xml version="1.0" encoding="utf-8"?>
+<p:sld xmlns:a="http://schemas.openxmlformats.org/drawingml/2006/main" xmlns:r="http://schemas.openxmlformats.org/officeDocument/2006/relationships" xmlns:p="http://schemas.openxmlformats.org/presentationml/2006/main">
+  <p:cSld>
+    <p:spTree>
+      <p:nvGrpSpPr>
+        <p:cNvPr id="1" name=""/>
+        <p:cNvGrpSpPr/>
+        <p:nvPr/>
+      </p:nvGrpSpPr>
+      <p:grpSpPr>
+        <a:xfrm>
+          <a:off x="0" y="0"/>
+          <a:ext cx="0" cy="0"/>
+          <a:chOff x="0" y="0"/>
+          <a:chExt cx="0" cy="0"/>
+        </a:xfrm>
+      </p:grpSpPr>
+      <p:sp>
+        <p:nvSpPr>
+          <p:cNvPr id="7" name="Titre 1">
+            <a:extLst>
+              <a:ext uri="{FF2B5EF4-FFF2-40B4-BE49-F238E27FC236}">
+                <a16:creationId xmlns:a16="http://schemas.microsoft.com/office/drawing/2014/main" id="{66300400-AE21-471A-B195-6FC709360802}"/>
+              </a:ext>
+            </a:extLst>
+          </p:cNvPr>
+          <p:cNvSpPr txBox="1">
+            <a:spLocks/>
+          </p:cNvSpPr>
+          <p:nvPr/>
+        </p:nvSpPr>
+        <p:spPr>
+          <a:xfrm>
+            <a:off x="3251479" y="1508745"/>
+            <a:ext cx="5558225" cy="2406632"/>
+          </a:xfrm>
+          <a:prstGeom prst="rect">
+            <a:avLst/>
+          </a:prstGeom>
+        </p:spPr>
+        <p:txBody>
+          <a:bodyPr vert="horz" lIns="91440" tIns="45720" rIns="91440" bIns="45720" rtlCol="0" anchor="b">
+            <a:normAutofit/>
+          </a:bodyPr>
+          <a:lstStyle>
+            <a:lvl1pPr algn="l" defTabSz="914400" rtl="0" eaLnBrk="1" latinLnBrk="0" hangingPunct="1">
+              <a:lnSpc>
+                <a:spcPct val="90000"/>
+              </a:lnSpc>
+              <a:spcBef>
+                <a:spcPct val="0"/>
+              </a:spcBef>
+              <a:buNone/>
+              <a:defRPr sz="4400" kern="1200">
+                <a:solidFill>
+                  <a:schemeClr val="tx1"/>
+                </a:solidFill>
+                <a:latin typeface="+mj-lt"/>
+                <a:ea typeface="+mj-ea"/>
+                <a:cs typeface="+mj-cs"/>
+              </a:defRPr>
+            </a:lvl1pPr>
+          </a:lstStyle>
+          <a:p>
+            <a:pPr algn="ctr"/>
+            <a:r>
+              <a:rPr lang="en-US" sz="6000" dirty="0" smtClean="0">
+                <a:solidFill>
+                  <a:srgbClr val="FFC000"/>
+                </a:solidFill>
+                <a:latin typeface="+mn-lt"/>
+              </a:rPr>
+              <a:t>ANNEXES</a:t>
+            </a:r>
+            <a:endParaRPr lang="en-US" sz="6000" dirty="0">
+              <a:solidFill>
+                <a:srgbClr val="FFC000"/>
+              </a:solidFill>
+              <a:latin typeface="+mn-lt"/>
+            </a:endParaRPr>
+          </a:p>
+        </p:txBody>
+      </p:sp>
+    </p:spTree>
+    <p:extLst>
+      <p:ext uri="{BB962C8B-B14F-4D97-AF65-F5344CB8AC3E}">
+        <p14:creationId xmlns:p14="http://schemas.microsoft.com/office/powerpoint/2010/main" val="2379412154"/>
+      </p:ext>
+    </p:extLst>
+  </p:cSld>
+  <p:clrMapOvr>
+    <a:masterClrMapping/>
+  </p:clrMapOvr>
+  <p:timing>
+    <p:tnLst>
+      <p:par>
+        <p:cTn id="1" dur="indefinite" restart="never" nodeType="tmRoot"/>
+      </p:par>
+    </p:tnLst>
+  </p:timing>
+</p:sld>
+</file>
+
+<file path=ppt/slides/slide33.xml><?xml version="1.0" encoding="utf-8"?>
+<p:sld xmlns:a="http://schemas.openxmlformats.org/drawingml/2006/main" xmlns:r="http://schemas.openxmlformats.org/officeDocument/2006/relationships" xmlns:p="http://schemas.openxmlformats.org/presentationml/2006/main">
+  <p:cSld>
+    <p:spTree>
+      <p:nvGrpSpPr>
+        <p:cNvPr id="1" name=""/>
+        <p:cNvGrpSpPr/>
+        <p:nvPr/>
+      </p:nvGrpSpPr>
+      <p:grpSpPr>
+        <a:xfrm>
+          <a:off x="0" y="0"/>
+          <a:ext cx="0" cy="0"/>
+          <a:chOff x="0" y="0"/>
+          <a:chExt cx="0" cy="0"/>
+        </a:xfrm>
+      </p:grpSpPr>
+      <p:sp>
+        <p:nvSpPr>
           <p:cNvPr id="4" name="Titre 1">
             <a:extLst>
               <a:ext uri="{FF2B5EF4-FFF2-40B4-BE49-F238E27FC236}">
@@ -8033,7 +9040,7 @@
 </p:sld>
 </file>
 
-<file path=ppt/slides/slide32.xml><?xml version="1.0" encoding="utf-8"?>
+<file path=ppt/slides/slide34.xml><?xml version="1.0" encoding="utf-8"?>
 <p:sld xmlns:a="http://schemas.openxmlformats.org/drawingml/2006/main" xmlns:r="http://schemas.openxmlformats.org/officeDocument/2006/relationships" xmlns:p="http://schemas.openxmlformats.org/presentationml/2006/main">
   <p:cSld>
     <p:spTree>

</xml_diff>